<commit_message>
Fixing slide 11 images/alt text
</commit_message>
<xml_diff>
--- a/Whiteboard design session/WDS trainer presentation - Line-of-business application migration.pptx
+++ b/Whiteboard design session/WDS trainer presentation - Line-of-business application migration.pptx
@@ -19,7 +19,7 @@
     <p:sldId id="326" r:id="rId13"/>
     <p:sldId id="304" r:id="rId14"/>
     <p:sldId id="1942" r:id="rId15"/>
-    <p:sldId id="357" r:id="rId16"/>
+    <p:sldId id="1944" r:id="rId16"/>
     <p:sldId id="1935" r:id="rId17"/>
     <p:sldId id="320" r:id="rId18"/>
     <p:sldId id="322" r:id="rId19"/>
@@ -231,7 +231,7 @@
           <a:p>
             <a:fld id="{52A13B17-C506-4D51-BB37-16B365906619}" type="datetimeFigureOut">
               <a:rPr lang="en-US" smtClean="0"/>
-              <a:t>5/5/2019</a:t>
+              <a:t>5/27/2019</a:t>
             </a:fld>
             <a:endParaRPr lang="en-US" dirty="0"/>
           </a:p>
@@ -1532,7 +1532,7 @@
           <a:p>
             <a:fld id="{386CE63F-9E7F-4C04-9D0D-FCA25A8E9E86}" type="datetime8">
               <a:rPr lang="en-US" smtClean="0"/>
-              <a:t>5/5/2019 7:52 PM</a:t>
+              <a:t>5/27/2019 10:24 AM</a:t>
             </a:fld>
             <a:endParaRPr lang="en-US" dirty="0"/>
           </a:p>
@@ -1793,7 +1793,7 @@
           <a:p>
             <a:fld id="{386CE63F-9E7F-4C04-9D0D-FCA25A8E9E86}" type="datetime8">
               <a:rPr lang="en-US" smtClean="0"/>
-              <a:t>5/5/2019 7:52 PM</a:t>
+              <a:t>5/27/2019 10:24 AM</a:t>
             </a:fld>
             <a:endParaRPr lang="en-US" dirty="0"/>
           </a:p>
@@ -1970,7 +1970,7 @@
           <a:p>
             <a:fld id="{386CE63F-9E7F-4C04-9D0D-FCA25A8E9E86}" type="datetime8">
               <a:rPr lang="en-US" smtClean="0"/>
-              <a:t>5/5/2019 7:52 PM</a:t>
+              <a:t>5/27/2019 10:24 AM</a:t>
             </a:fld>
             <a:endParaRPr lang="en-US" dirty="0"/>
           </a:p>
@@ -2147,7 +2147,7 @@
           <a:p>
             <a:fld id="{386CE63F-9E7F-4C04-9D0D-FCA25A8E9E86}" type="datetime8">
               <a:rPr lang="en-US" smtClean="0"/>
-              <a:t>5/5/2019 7:52 PM</a:t>
+              <a:t>5/27/2019 10:24 AM</a:t>
             </a:fld>
             <a:endParaRPr lang="en-US" dirty="0"/>
           </a:p>
@@ -2324,7 +2324,7 @@
           <a:p>
             <a:fld id="{386CE63F-9E7F-4C04-9D0D-FCA25A8E9E86}" type="datetime8">
               <a:rPr lang="en-US" smtClean="0"/>
-              <a:t>5/5/2019 7:52 PM</a:t>
+              <a:t>5/27/2019 10:24 AM</a:t>
             </a:fld>
             <a:endParaRPr lang="en-US" dirty="0"/>
           </a:p>
@@ -2501,7 +2501,7 @@
           <a:p>
             <a:fld id="{386CE63F-9E7F-4C04-9D0D-FCA25A8E9E86}" type="datetime8">
               <a:rPr lang="en-US" smtClean="0"/>
-              <a:t>5/5/2019 7:52 PM</a:t>
+              <a:t>5/27/2019 10:24 AM</a:t>
             </a:fld>
             <a:endParaRPr lang="en-US" dirty="0"/>
           </a:p>
@@ -2678,7 +2678,7 @@
           <a:p>
             <a:fld id="{386CE63F-9E7F-4C04-9D0D-FCA25A8E9E86}" type="datetime8">
               <a:rPr lang="en-US" smtClean="0"/>
-              <a:t>5/5/2019 7:52 PM</a:t>
+              <a:t>5/27/2019 10:24 AM</a:t>
             </a:fld>
             <a:endParaRPr lang="en-US" dirty="0"/>
           </a:p>
@@ -3935,7 +3935,7 @@
                   <a:prstClr val="black"/>
                 </a:solidFill>
               </a:rPr>
-              <a:t>5/5/2019 7:52 PM</a:t>
+              <a:t>5/27/2019 10:24 AM</a:t>
             </a:fld>
             <a:endParaRPr lang="en-US" dirty="0">
               <a:solidFill>
@@ -17150,7 +17150,12 @@
             <p:ph type="title"/>
           </p:nvPr>
         </p:nvSpPr>
-        <p:spPr/>
+        <p:spPr>
+          <a:xfrm>
+            <a:off x="269240" y="289511"/>
+            <a:ext cx="11655840" cy="899665"/>
+          </a:xfrm>
+        </p:spPr>
         <p:txBody>
           <a:bodyPr>
             <a:normAutofit fontScale="90000"/>
@@ -17183,983 +17188,6 @@
           </a:p>
         </p:txBody>
       </p:sp>
-      <p:sp>
-        <p:nvSpPr>
-          <p:cNvPr id="113" name="Rectangle 112">
-            <a:extLst>
-              <a:ext uri="{FF2B5EF4-FFF2-40B4-BE49-F238E27FC236}">
-                <a16:creationId xmlns:a16="http://schemas.microsoft.com/office/drawing/2014/main" id="{4F520B2D-2C19-4866-A54B-7EC98B7C02B7}"/>
-              </a:ext>
-            </a:extLst>
-          </p:cNvPr>
-          <p:cNvSpPr/>
-          <p:nvPr/>
-        </p:nvSpPr>
-        <p:spPr bwMode="auto">
-          <a:xfrm>
-            <a:off x="788751" y="3021032"/>
-            <a:ext cx="3096077" cy="689363"/>
-          </a:xfrm>
-          <a:prstGeom prst="rect">
-            <a:avLst/>
-          </a:prstGeom>
-          <a:solidFill>
-            <a:srgbClr val="FFFFFF"/>
-          </a:solidFill>
-          <a:ln w="25400" cap="flat" cmpd="sng" algn="ctr">
-            <a:noFill/>
-            <a:prstDash val="solid"/>
-            <a:headEnd type="none" w="med" len="med"/>
-            <a:tailEnd type="none" w="med" len="med"/>
-          </a:ln>
-          <a:effectLst/>
-        </p:spPr>
-        <p:txBody>
-          <a:bodyPr vert="horz" wrap="square" lIns="182854" tIns="91427" rIns="91427" bIns="91427" numCol="1" rtlCol="0" anchor="ctr" anchorCtr="0" compatLnSpc="1">
-            <a:prstTxWarp prst="textNoShape">
-              <a:avLst/>
-            </a:prstTxWarp>
-          </a:bodyPr>
-          <a:lstStyle/>
-          <a:p>
-            <a:pPr marL="0" marR="0" lvl="0" indent="0" algn="ctr" defTabSz="913673" eaLnBrk="1" fontAlgn="auto" latinLnBrk="0" hangingPunct="1">
-              <a:lnSpc>
-                <a:spcPct val="100000"/>
-              </a:lnSpc>
-              <a:spcBef>
-                <a:spcPts val="2000"/>
-              </a:spcBef>
-              <a:spcAft>
-                <a:spcPts val="0"/>
-              </a:spcAft>
-              <a:buClrTx/>
-              <a:buSzTx/>
-              <a:buFontTx/>
-              <a:buNone/>
-              <a:tabLst/>
-              <a:defRPr/>
-            </a:pPr>
-            <a:r>
-              <a:rPr kumimoji="0" lang="en-US" sz="2000" b="0" i="0" u="none" strike="noStrike" kern="0" cap="none" spc="0" normalizeH="0" baseline="0" noProof="0" dirty="0">
-                <a:ln>
-                  <a:noFill/>
-                </a:ln>
-                <a:solidFill>
-                  <a:srgbClr val="000000"/>
-                </a:solidFill>
-                <a:effectLst/>
-                <a:uLnTx/>
-                <a:uFillTx/>
-                <a:latin typeface="Calibri"/>
-                <a:ea typeface="+mn-ea"/>
-                <a:cs typeface="+mn-cs"/>
-              </a:rPr>
-              <a:t>Azure Migrate</a:t>
-            </a:r>
-          </a:p>
-        </p:txBody>
-      </p:sp>
-      <p:sp>
-        <p:nvSpPr>
-          <p:cNvPr id="112" name="Rectangle 111">
-            <a:extLst>
-              <a:ext uri="{FF2B5EF4-FFF2-40B4-BE49-F238E27FC236}">
-                <a16:creationId xmlns:a16="http://schemas.microsoft.com/office/drawing/2014/main" id="{D5F78B83-BBD4-4544-8761-B7DAFF23088A}"/>
-              </a:ext>
-            </a:extLst>
-          </p:cNvPr>
-          <p:cNvSpPr/>
-          <p:nvPr/>
-        </p:nvSpPr>
-        <p:spPr bwMode="auto">
-          <a:xfrm>
-            <a:off x="788751" y="3941336"/>
-            <a:ext cx="3096077" cy="975520"/>
-          </a:xfrm>
-          <a:prstGeom prst="rect">
-            <a:avLst/>
-          </a:prstGeom>
-          <a:solidFill>
-            <a:srgbClr val="FFFFFF">
-              <a:lumMod val="95000"/>
-            </a:srgbClr>
-          </a:solidFill>
-          <a:ln w="25400" cap="flat" cmpd="sng" algn="ctr">
-            <a:noFill/>
-            <a:prstDash val="solid"/>
-            <a:headEnd type="none" w="med" len="med"/>
-            <a:tailEnd type="none" w="med" len="med"/>
-          </a:ln>
-          <a:effectLst/>
-        </p:spPr>
-        <p:txBody>
-          <a:bodyPr rot="0" spcFirstLastPara="0" vertOverflow="overflow" horzOverflow="overflow" vert="horz" wrap="square" lIns="108000" tIns="108000" rIns="108000" bIns="108000" numCol="1" spcCol="0" rtlCol="0" fromWordArt="0" anchor="t" anchorCtr="0" forceAA="0" compatLnSpc="1">
-            <a:prstTxWarp prst="textNoShape">
-              <a:avLst/>
-            </a:prstTxWarp>
-            <a:noAutofit/>
-          </a:bodyPr>
-          <a:lstStyle/>
-          <a:p>
-            <a:pPr marL="0" marR="0" lvl="0" indent="0" defTabSz="896386" eaLnBrk="1" fontAlgn="auto" latinLnBrk="0" hangingPunct="1">
-              <a:lnSpc>
-                <a:spcPct val="100000"/>
-              </a:lnSpc>
-              <a:spcBef>
-                <a:spcPts val="2000"/>
-              </a:spcBef>
-              <a:spcAft>
-                <a:spcPts val="196"/>
-              </a:spcAft>
-              <a:buClrTx/>
-              <a:buSzTx/>
-              <a:buFontTx/>
-              <a:buNone/>
-              <a:tabLst/>
-              <a:defRPr/>
-            </a:pPr>
-            <a:r>
-              <a:rPr kumimoji="0" lang="en-US" sz="1400" b="0" i="0" u="none" strike="noStrike" kern="0" cap="none" spc="0" normalizeH="0" baseline="0" noProof="0" dirty="0">
-                <a:ln>
-                  <a:noFill/>
-                </a:ln>
-                <a:solidFill>
-                  <a:schemeClr val="bg1"/>
-                </a:solidFill>
-                <a:effectLst/>
-                <a:uLnTx/>
-                <a:uFillTx/>
-                <a:latin typeface="Calibri"/>
-                <a:ea typeface="+mn-ea"/>
-                <a:cs typeface="+mn-cs"/>
-              </a:rPr>
-              <a:t>Azure Migrate can </a:t>
-            </a:r>
-            <a:r>
-              <a:rPr lang="en-US" sz="1400" kern="0" dirty="0">
-                <a:solidFill>
-                  <a:schemeClr val="bg1"/>
-                </a:solidFill>
-                <a:latin typeface="Calibri"/>
-              </a:rPr>
-              <a:t>assess</a:t>
-            </a:r>
-            <a:r>
-              <a:rPr kumimoji="0" lang="en-US" sz="1400" b="0" i="0" u="none" strike="noStrike" kern="0" cap="none" spc="0" normalizeH="0" baseline="0" noProof="0" dirty="0">
-                <a:ln>
-                  <a:noFill/>
-                </a:ln>
-                <a:solidFill>
-                  <a:schemeClr val="bg1"/>
-                </a:solidFill>
-                <a:effectLst/>
-                <a:uLnTx/>
-                <a:uFillTx/>
-                <a:latin typeface="Calibri"/>
-                <a:ea typeface="+mn-ea"/>
-                <a:cs typeface="+mn-cs"/>
-              </a:rPr>
-              <a:t> your VMware environment for Azure suitability, sizing recommendations and cost estimates.</a:t>
-            </a:r>
-          </a:p>
-        </p:txBody>
-      </p:sp>
-      <p:sp>
-        <p:nvSpPr>
-          <p:cNvPr id="114" name="Rectangle 113">
-            <a:extLst>
-              <a:ext uri="{FF2B5EF4-FFF2-40B4-BE49-F238E27FC236}">
-                <a16:creationId xmlns:a16="http://schemas.microsoft.com/office/drawing/2014/main" id="{B30574D1-FF21-4E16-A050-116BFB0D8B85}"/>
-              </a:ext>
-            </a:extLst>
-          </p:cNvPr>
-          <p:cNvSpPr/>
-          <p:nvPr/>
-        </p:nvSpPr>
-        <p:spPr bwMode="auto">
-          <a:xfrm>
-            <a:off x="4309902" y="3021032"/>
-            <a:ext cx="3096077" cy="689363"/>
-          </a:xfrm>
-          <a:prstGeom prst="rect">
-            <a:avLst/>
-          </a:prstGeom>
-          <a:solidFill>
-            <a:srgbClr val="FFFFFF"/>
-          </a:solidFill>
-          <a:ln w="25400" cap="flat" cmpd="sng" algn="ctr">
-            <a:noFill/>
-            <a:prstDash val="solid"/>
-            <a:headEnd type="none" w="med" len="med"/>
-            <a:tailEnd type="none" w="med" len="med"/>
-          </a:ln>
-          <a:effectLst/>
-        </p:spPr>
-        <p:txBody>
-          <a:bodyPr vert="horz" wrap="square" lIns="182854" tIns="91427" rIns="91427" bIns="91427" numCol="1" rtlCol="0" anchor="ctr" anchorCtr="0" compatLnSpc="1">
-            <a:prstTxWarp prst="textNoShape">
-              <a:avLst/>
-            </a:prstTxWarp>
-          </a:bodyPr>
-          <a:lstStyle/>
-          <a:p>
-            <a:pPr marL="0" marR="0" lvl="0" indent="0" algn="ctr" defTabSz="896386" eaLnBrk="1" fontAlgn="auto" latinLnBrk="0" hangingPunct="1">
-              <a:lnSpc>
-                <a:spcPct val="100000"/>
-              </a:lnSpc>
-              <a:spcBef>
-                <a:spcPts val="2000"/>
-              </a:spcBef>
-              <a:spcAft>
-                <a:spcPts val="0"/>
-              </a:spcAft>
-              <a:buClrTx/>
-              <a:buSzTx/>
-              <a:buFontTx/>
-              <a:buNone/>
-              <a:tabLst/>
-              <a:defRPr/>
-            </a:pPr>
-            <a:r>
-              <a:rPr kumimoji="0" lang="en-US" sz="2000" b="0" i="0" u="none" strike="noStrike" kern="0" cap="none" spc="0" normalizeH="0" baseline="0" noProof="0" dirty="0">
-                <a:ln>
-                  <a:noFill/>
-                </a:ln>
-                <a:solidFill>
-                  <a:srgbClr val="000000"/>
-                </a:solidFill>
-                <a:effectLst/>
-                <a:uLnTx/>
-                <a:uFillTx/>
-                <a:latin typeface="Calibri"/>
-                <a:ea typeface="+mn-ea"/>
-                <a:cs typeface="+mn-cs"/>
-              </a:rPr>
-              <a:t>Azure Site Recovery</a:t>
-            </a:r>
-          </a:p>
-        </p:txBody>
-      </p:sp>
-      <p:sp>
-        <p:nvSpPr>
-          <p:cNvPr id="115" name="Rectangle 114">
-            <a:extLst>
-              <a:ext uri="{FF2B5EF4-FFF2-40B4-BE49-F238E27FC236}">
-                <a16:creationId xmlns:a16="http://schemas.microsoft.com/office/drawing/2014/main" id="{3EDBA6EA-005B-4453-9C8F-333F84309D0D}"/>
-              </a:ext>
-            </a:extLst>
-          </p:cNvPr>
-          <p:cNvSpPr/>
-          <p:nvPr/>
-        </p:nvSpPr>
-        <p:spPr bwMode="auto">
-          <a:xfrm>
-            <a:off x="4309902" y="3941336"/>
-            <a:ext cx="3096077" cy="987462"/>
-          </a:xfrm>
-          <a:prstGeom prst="rect">
-            <a:avLst/>
-          </a:prstGeom>
-          <a:solidFill>
-            <a:srgbClr val="FFFFFF">
-              <a:lumMod val="95000"/>
-            </a:srgbClr>
-          </a:solidFill>
-          <a:ln w="25400" cap="flat" cmpd="sng" algn="ctr">
-            <a:noFill/>
-            <a:prstDash val="solid"/>
-            <a:headEnd type="none" w="med" len="med"/>
-            <a:tailEnd type="none" w="med" len="med"/>
-          </a:ln>
-          <a:effectLst/>
-        </p:spPr>
-        <p:txBody>
-          <a:bodyPr rot="0" spcFirstLastPara="0" vertOverflow="overflow" horzOverflow="overflow" vert="horz" wrap="square" lIns="108000" tIns="108000" rIns="108000" bIns="108000" numCol="1" spcCol="0" rtlCol="0" fromWordArt="0" anchor="t" anchorCtr="0" forceAA="0" compatLnSpc="1">
-            <a:prstTxWarp prst="textNoShape">
-              <a:avLst/>
-            </a:prstTxWarp>
-            <a:noAutofit/>
-          </a:bodyPr>
-          <a:lstStyle/>
-          <a:p>
-            <a:pPr lvl="0" defTabSz="896386">
-              <a:spcBef>
-                <a:spcPts val="2000"/>
-              </a:spcBef>
-              <a:spcAft>
-                <a:spcPts val="196"/>
-              </a:spcAft>
-              <a:defRPr/>
-            </a:pPr>
-            <a:r>
-              <a:rPr lang="en-US" sz="1400" kern="0" dirty="0">
-                <a:solidFill>
-                  <a:schemeClr val="bg1"/>
-                </a:solidFill>
-                <a:latin typeface="Calibri"/>
-              </a:rPr>
-              <a:t>Use Azure Site Recovery for disaster recovery or to migrate on-premises application to Azure.</a:t>
-            </a:r>
-          </a:p>
-        </p:txBody>
-      </p:sp>
-      <p:sp>
-        <p:nvSpPr>
-          <p:cNvPr id="116" name="Rectangle 115">
-            <a:extLst>
-              <a:ext uri="{FF2B5EF4-FFF2-40B4-BE49-F238E27FC236}">
-                <a16:creationId xmlns:a16="http://schemas.microsoft.com/office/drawing/2014/main" id="{D547B2E5-1BF1-43F3-997B-0258494DC449}"/>
-              </a:ext>
-            </a:extLst>
-          </p:cNvPr>
-          <p:cNvSpPr/>
-          <p:nvPr/>
-        </p:nvSpPr>
-        <p:spPr bwMode="auto">
-          <a:xfrm>
-            <a:off x="7831053" y="3021032"/>
-            <a:ext cx="3760057" cy="689363"/>
-          </a:xfrm>
-          <a:prstGeom prst="rect">
-            <a:avLst/>
-          </a:prstGeom>
-          <a:solidFill>
-            <a:srgbClr val="FFFFFF"/>
-          </a:solidFill>
-          <a:ln w="25400" cap="flat" cmpd="sng" algn="ctr">
-            <a:noFill/>
-            <a:prstDash val="solid"/>
-            <a:headEnd type="none" w="med" len="med"/>
-            <a:tailEnd type="none" w="med" len="med"/>
-          </a:ln>
-          <a:effectLst/>
-        </p:spPr>
-        <p:txBody>
-          <a:bodyPr vert="horz" wrap="square" lIns="182854" tIns="91427" rIns="91427" bIns="91427" numCol="1" rtlCol="0" anchor="ctr" anchorCtr="0" compatLnSpc="1">
-            <a:prstTxWarp prst="textNoShape">
-              <a:avLst/>
-            </a:prstTxWarp>
-          </a:bodyPr>
-          <a:lstStyle/>
-          <a:p>
-            <a:pPr marL="0" marR="0" lvl="0" indent="0" algn="ctr" defTabSz="896386" eaLnBrk="1" fontAlgn="auto" latinLnBrk="0" hangingPunct="1">
-              <a:lnSpc>
-                <a:spcPct val="100000"/>
-              </a:lnSpc>
-              <a:spcBef>
-                <a:spcPts val="2000"/>
-              </a:spcBef>
-              <a:spcAft>
-                <a:spcPts val="0"/>
-              </a:spcAft>
-              <a:buClrTx/>
-              <a:buSzTx/>
-              <a:buFontTx/>
-              <a:buNone/>
-              <a:tabLst/>
-              <a:defRPr/>
-            </a:pPr>
-            <a:r>
-              <a:rPr kumimoji="0" lang="en-US" b="0" i="0" u="none" strike="noStrike" kern="0" cap="none" spc="0" normalizeH="0" baseline="0" noProof="0" dirty="0">
-                <a:ln>
-                  <a:noFill/>
-                </a:ln>
-                <a:solidFill>
-                  <a:srgbClr val="000000"/>
-                </a:solidFill>
-                <a:effectLst/>
-                <a:uLnTx/>
-                <a:uFillTx/>
-                <a:latin typeface="Calibri"/>
-                <a:ea typeface="+mn-ea"/>
-                <a:cs typeface="+mn-cs"/>
-              </a:rPr>
-              <a:t>Azure Database Migration Service</a:t>
-            </a:r>
-            <a:br>
-              <a:rPr kumimoji="0" lang="en-US" b="0" i="0" u="none" strike="noStrike" kern="0" cap="none" spc="0" normalizeH="0" baseline="0" noProof="0" dirty="0">
-                <a:ln>
-                  <a:noFill/>
-                </a:ln>
-                <a:solidFill>
-                  <a:srgbClr val="000000"/>
-                </a:solidFill>
-                <a:effectLst/>
-                <a:uLnTx/>
-                <a:uFillTx/>
-                <a:latin typeface="Calibri"/>
-                <a:ea typeface="+mn-ea"/>
-                <a:cs typeface="+mn-cs"/>
-              </a:rPr>
-            </a:br>
-            <a:r>
-              <a:rPr lang="en-US" kern="0" dirty="0">
-                <a:solidFill>
-                  <a:srgbClr val="000000"/>
-                </a:solidFill>
-                <a:latin typeface="Calibri"/>
-              </a:rPr>
-              <a:t>Microsoft Data Migration Assistant</a:t>
-            </a:r>
-            <a:endParaRPr kumimoji="0" lang="en-US" b="0" i="0" u="none" strike="noStrike" kern="0" cap="none" spc="0" normalizeH="0" baseline="0" noProof="0" dirty="0">
-              <a:ln>
-                <a:noFill/>
-              </a:ln>
-              <a:solidFill>
-                <a:srgbClr val="000000"/>
-              </a:solidFill>
-              <a:effectLst/>
-              <a:uLnTx/>
-              <a:uFillTx/>
-              <a:latin typeface="Calibri"/>
-              <a:ea typeface="+mn-ea"/>
-              <a:cs typeface="+mn-cs"/>
-            </a:endParaRPr>
-          </a:p>
-        </p:txBody>
-      </p:sp>
-      <p:sp>
-        <p:nvSpPr>
-          <p:cNvPr id="117" name="Rectangle 116">
-            <a:extLst>
-              <a:ext uri="{FF2B5EF4-FFF2-40B4-BE49-F238E27FC236}">
-                <a16:creationId xmlns:a16="http://schemas.microsoft.com/office/drawing/2014/main" id="{930BC2A8-BCCE-4B23-BC3B-74F51B7889CD}"/>
-              </a:ext>
-            </a:extLst>
-          </p:cNvPr>
-          <p:cNvSpPr/>
-          <p:nvPr/>
-        </p:nvSpPr>
-        <p:spPr>
-          <a:xfrm>
-            <a:off x="7831053" y="3941336"/>
-            <a:ext cx="3760057" cy="1819384"/>
-          </a:xfrm>
-          <a:prstGeom prst="rect">
-            <a:avLst/>
-          </a:prstGeom>
-          <a:solidFill>
-            <a:srgbClr val="FFFFFF">
-              <a:lumMod val="95000"/>
-            </a:srgbClr>
-          </a:solidFill>
-        </p:spPr>
-        <p:txBody>
-          <a:bodyPr vert="horz" wrap="square" lIns="108000" tIns="108000" rIns="108000" bIns="108000" anchor="t" anchorCtr="0">
-            <a:noAutofit/>
-          </a:bodyPr>
-          <a:lstStyle/>
-          <a:p>
-            <a:pPr marL="0" marR="0" lvl="0" indent="0" defTabSz="896386" eaLnBrk="1" fontAlgn="auto" latinLnBrk="0" hangingPunct="1">
-              <a:lnSpc>
-                <a:spcPct val="100000"/>
-              </a:lnSpc>
-              <a:spcBef>
-                <a:spcPts val="600"/>
-              </a:spcBef>
-              <a:spcAft>
-                <a:spcPts val="196"/>
-              </a:spcAft>
-              <a:buClrTx/>
-              <a:buSzTx/>
-              <a:buFontTx/>
-              <a:buNone/>
-              <a:tabLst/>
-              <a:defRPr/>
-            </a:pPr>
-            <a:r>
-              <a:rPr lang="en-US" sz="1400" kern="0" dirty="0">
-                <a:solidFill>
-                  <a:schemeClr val="bg1"/>
-                </a:solidFill>
-                <a:latin typeface="Calibri"/>
-              </a:rPr>
-              <a:t>Azure Database Migration Service migrates  on-premises database to Azure with minimal downtime.</a:t>
-            </a:r>
-          </a:p>
-          <a:p>
-            <a:pPr marL="0" marR="0" lvl="0" indent="0" defTabSz="896386" eaLnBrk="1" fontAlgn="auto" latinLnBrk="0" hangingPunct="1">
-              <a:lnSpc>
-                <a:spcPct val="100000"/>
-              </a:lnSpc>
-              <a:spcBef>
-                <a:spcPts val="600"/>
-              </a:spcBef>
-              <a:spcAft>
-                <a:spcPts val="196"/>
-              </a:spcAft>
-              <a:buClrTx/>
-              <a:buSzTx/>
-              <a:buFontTx/>
-              <a:buNone/>
-              <a:tabLst/>
-              <a:defRPr/>
-            </a:pPr>
-            <a:r>
-              <a:rPr kumimoji="0" lang="en-US" sz="1400" b="0" i="0" u="none" strike="noStrike" kern="0" cap="none" spc="0" normalizeH="0" baseline="0" noProof="0" dirty="0">
-                <a:ln>
-                  <a:noFill/>
-                </a:ln>
-                <a:solidFill>
-                  <a:schemeClr val="bg1"/>
-                </a:solidFill>
-                <a:effectLst/>
-                <a:uLnTx/>
-                <a:uFillTx/>
-                <a:latin typeface="Calibri"/>
-              </a:rPr>
-              <a:t>The Microsoft Data Migration Assistant supports the Database Migration Service by performing database compatibility assessments and schema migration.</a:t>
-            </a:r>
-          </a:p>
-        </p:txBody>
-      </p:sp>
-      <p:grpSp>
-        <p:nvGrpSpPr>
-          <p:cNvPr id="9" name="Graphic 3" descr="Azure Site Recovery icon">
-            <a:extLst>
-              <a:ext uri="{FF2B5EF4-FFF2-40B4-BE49-F238E27FC236}">
-                <a16:creationId xmlns:a16="http://schemas.microsoft.com/office/drawing/2014/main" id="{D27C5937-1FD1-4216-88D6-FA54280C9E49}"/>
-              </a:ext>
-              <a:ext uri="{C183D7F6-B498-43B3-948B-1728B52AA6E4}">
-                <adec:decorative xmlns:adec="http://schemas.microsoft.com/office/drawing/2017/decorative" val="0"/>
-              </a:ext>
-            </a:extLst>
-          </p:cNvPr>
-          <p:cNvGrpSpPr/>
-          <p:nvPr/>
-        </p:nvGrpSpPr>
-        <p:grpSpPr>
-          <a:xfrm>
-            <a:off x="5465371" y="1854694"/>
-            <a:ext cx="851958" cy="851958"/>
-            <a:chOff x="5129742" y="2197594"/>
-            <a:chExt cx="476250" cy="476250"/>
-          </a:xfrm>
-          <a:solidFill>
-            <a:schemeClr val="tx1"/>
-          </a:solidFill>
-        </p:grpSpPr>
-        <p:sp>
-          <p:nvSpPr>
-            <p:cNvPr id="12" name="Freeform: Shape 11">
-              <a:extLst>
-                <a:ext uri="{FF2B5EF4-FFF2-40B4-BE49-F238E27FC236}">
-                  <a16:creationId xmlns:a16="http://schemas.microsoft.com/office/drawing/2014/main" id="{70E3946A-BABB-4AED-AE2A-BDD24E764F7C}"/>
-                </a:ext>
-              </a:extLst>
-            </p:cNvPr>
-            <p:cNvSpPr/>
-            <p:nvPr/>
-          </p:nvSpPr>
-          <p:spPr>
-            <a:xfrm>
-              <a:off x="5250233" y="2220930"/>
-              <a:ext cx="361950" cy="276225"/>
-            </a:xfrm>
-            <a:custGeom>
-              <a:avLst/>
-              <a:gdLst>
-                <a:gd name="connsiteX0" fmla="*/ 150019 w 361950"/>
-                <a:gd name="connsiteY0" fmla="*/ 136684 h 276225"/>
-                <a:gd name="connsiteX1" fmla="*/ 260509 w 361950"/>
-                <a:gd name="connsiteY1" fmla="*/ 233839 h 276225"/>
-                <a:gd name="connsiteX2" fmla="*/ 291941 w 361950"/>
-                <a:gd name="connsiteY2" fmla="*/ 270034 h 276225"/>
-                <a:gd name="connsiteX3" fmla="*/ 354806 w 361950"/>
-                <a:gd name="connsiteY3" fmla="*/ 189071 h 276225"/>
-                <a:gd name="connsiteX4" fmla="*/ 308134 w 361950"/>
-                <a:gd name="connsiteY4" fmla="*/ 118586 h 276225"/>
-                <a:gd name="connsiteX5" fmla="*/ 308134 w 361950"/>
-                <a:gd name="connsiteY5" fmla="*/ 108109 h 276225"/>
-                <a:gd name="connsiteX6" fmla="*/ 207169 w 361950"/>
-                <a:gd name="connsiteY6" fmla="*/ 7144 h 276225"/>
-                <a:gd name="connsiteX7" fmla="*/ 124301 w 361950"/>
-                <a:gd name="connsiteY7" fmla="*/ 49054 h 276225"/>
-                <a:gd name="connsiteX8" fmla="*/ 83344 w 361950"/>
-                <a:gd name="connsiteY8" fmla="*/ 37624 h 276225"/>
-                <a:gd name="connsiteX9" fmla="*/ 7144 w 361950"/>
-                <a:gd name="connsiteY9" fmla="*/ 106204 h 276225"/>
-                <a:gd name="connsiteX10" fmla="*/ 26194 w 361950"/>
-                <a:gd name="connsiteY10" fmla="*/ 105251 h 276225"/>
-                <a:gd name="connsiteX11" fmla="*/ 116681 w 361950"/>
-                <a:gd name="connsiteY11" fmla="*/ 139541 h 276225"/>
-                <a:gd name="connsiteX12" fmla="*/ 150019 w 361950"/>
-                <a:gd name="connsiteY12" fmla="*/ 136684 h 276225"/>
-              </a:gdLst>
-              <a:ahLst/>
-              <a:cxnLst>
-                <a:cxn ang="0">
-                  <a:pos x="connsiteX0" y="connsiteY0"/>
-                </a:cxn>
-                <a:cxn ang="0">
-                  <a:pos x="connsiteX1" y="connsiteY1"/>
-                </a:cxn>
-                <a:cxn ang="0">
-                  <a:pos x="connsiteX2" y="connsiteY2"/>
-                </a:cxn>
-                <a:cxn ang="0">
-                  <a:pos x="connsiteX3" y="connsiteY3"/>
-                </a:cxn>
-                <a:cxn ang="0">
-                  <a:pos x="connsiteX4" y="connsiteY4"/>
-                </a:cxn>
-                <a:cxn ang="0">
-                  <a:pos x="connsiteX5" y="connsiteY5"/>
-                </a:cxn>
-                <a:cxn ang="0">
-                  <a:pos x="connsiteX6" y="connsiteY6"/>
-                </a:cxn>
-                <a:cxn ang="0">
-                  <a:pos x="connsiteX7" y="connsiteY7"/>
-                </a:cxn>
-                <a:cxn ang="0">
-                  <a:pos x="connsiteX8" y="connsiteY8"/>
-                </a:cxn>
-                <a:cxn ang="0">
-                  <a:pos x="connsiteX9" y="connsiteY9"/>
-                </a:cxn>
-                <a:cxn ang="0">
-                  <a:pos x="connsiteX10" y="connsiteY10"/>
-                </a:cxn>
-                <a:cxn ang="0">
-                  <a:pos x="connsiteX11" y="connsiteY11"/>
-                </a:cxn>
-                <a:cxn ang="0">
-                  <a:pos x="connsiteX12" y="connsiteY12"/>
-                </a:cxn>
-              </a:cxnLst>
-              <a:rect l="l" t="t" r="r" b="b"/>
-              <a:pathLst>
-                <a:path w="361950" h="276225">
-                  <a:moveTo>
-                    <a:pt x="150019" y="136684"/>
-                  </a:moveTo>
-                  <a:cubicBezTo>
-                    <a:pt x="207169" y="136684"/>
-                    <a:pt x="253841" y="179546"/>
-                    <a:pt x="260509" y="233839"/>
-                  </a:cubicBezTo>
-                  <a:cubicBezTo>
-                    <a:pt x="273844" y="244316"/>
-                    <a:pt x="284321" y="256699"/>
-                    <a:pt x="291941" y="270034"/>
-                  </a:cubicBezTo>
-                  <a:cubicBezTo>
-                    <a:pt x="329089" y="260509"/>
-                    <a:pt x="354806" y="228124"/>
-                    <a:pt x="354806" y="189071"/>
-                  </a:cubicBezTo>
-                  <a:cubicBezTo>
-                    <a:pt x="354806" y="157639"/>
-                    <a:pt x="337661" y="132874"/>
-                    <a:pt x="308134" y="118586"/>
-                  </a:cubicBezTo>
-                  <a:cubicBezTo>
-                    <a:pt x="308134" y="114776"/>
-                    <a:pt x="308134" y="111919"/>
-                    <a:pt x="308134" y="108109"/>
-                  </a:cubicBezTo>
-                  <a:cubicBezTo>
-                    <a:pt x="308134" y="52864"/>
-                    <a:pt x="262414" y="7144"/>
-                    <a:pt x="207169" y="7144"/>
-                  </a:cubicBezTo>
-                  <a:cubicBezTo>
-                    <a:pt x="173831" y="7144"/>
-                    <a:pt x="143351" y="23336"/>
-                    <a:pt x="124301" y="49054"/>
-                  </a:cubicBezTo>
-                  <a:cubicBezTo>
-                    <a:pt x="111919" y="41434"/>
-                    <a:pt x="98584" y="37624"/>
-                    <a:pt x="83344" y="37624"/>
-                  </a:cubicBezTo>
-                  <a:cubicBezTo>
-                    <a:pt x="43339" y="37624"/>
-                    <a:pt x="10954" y="68104"/>
-                    <a:pt x="7144" y="106204"/>
-                  </a:cubicBezTo>
-                  <a:cubicBezTo>
-                    <a:pt x="12859" y="105251"/>
-                    <a:pt x="19526" y="105251"/>
-                    <a:pt x="26194" y="105251"/>
-                  </a:cubicBezTo>
-                  <a:cubicBezTo>
-                    <a:pt x="55721" y="105251"/>
-                    <a:pt x="89059" y="110014"/>
-                    <a:pt x="116681" y="139541"/>
-                  </a:cubicBezTo>
-                  <a:lnTo>
-                    <a:pt x="150019" y="136684"/>
-                  </a:lnTo>
-                  <a:close/>
-                </a:path>
-              </a:pathLst>
-            </a:custGeom>
-            <a:grpFill/>
-            <a:ln w="9525" cap="flat">
-              <a:noFill/>
-              <a:prstDash val="solid"/>
-              <a:miter/>
-            </a:ln>
-          </p:spPr>
-          <p:txBody>
-            <a:bodyPr rtlCol="0" anchor="ctr"/>
-            <a:lstStyle/>
-            <a:p>
-              <a:endParaRPr lang="en-IE" dirty="0"/>
-            </a:p>
-          </p:txBody>
-        </p:sp>
-        <p:sp>
-          <p:nvSpPr>
-            <p:cNvPr id="14" name="Freeform: Shape 13">
-              <a:extLst>
-                <a:ext uri="{FF2B5EF4-FFF2-40B4-BE49-F238E27FC236}">
-                  <a16:creationId xmlns:a16="http://schemas.microsoft.com/office/drawing/2014/main" id="{50E0F33B-820E-4674-B9A3-144CAB5154C5}"/>
-                </a:ext>
-              </a:extLst>
-            </p:cNvPr>
-            <p:cNvSpPr/>
-            <p:nvPr/>
-          </p:nvSpPr>
-          <p:spPr>
-            <a:xfrm>
-              <a:off x="5122598" y="2354280"/>
-              <a:ext cx="400050" cy="276225"/>
-            </a:xfrm>
-            <a:custGeom>
-              <a:avLst/>
-              <a:gdLst>
-                <a:gd name="connsiteX0" fmla="*/ 354806 w 400050"/>
-                <a:gd name="connsiteY0" fmla="*/ 119539 h 276225"/>
-                <a:gd name="connsiteX1" fmla="*/ 354806 w 400050"/>
-                <a:gd name="connsiteY1" fmla="*/ 113824 h 276225"/>
-                <a:gd name="connsiteX2" fmla="*/ 278606 w 400050"/>
-                <a:gd name="connsiteY2" fmla="*/ 37624 h 276225"/>
-                <a:gd name="connsiteX3" fmla="*/ 241459 w 400050"/>
-                <a:gd name="connsiteY3" fmla="*/ 47149 h 276225"/>
-                <a:gd name="connsiteX4" fmla="*/ 241459 w 400050"/>
-                <a:gd name="connsiteY4" fmla="*/ 48101 h 276225"/>
-                <a:gd name="connsiteX5" fmla="*/ 241459 w 400050"/>
-                <a:gd name="connsiteY5" fmla="*/ 47149 h 276225"/>
-                <a:gd name="connsiteX6" fmla="*/ 237649 w 400050"/>
-                <a:gd name="connsiteY6" fmla="*/ 49054 h 276225"/>
-                <a:gd name="connsiteX7" fmla="*/ 236696 w 400050"/>
-                <a:gd name="connsiteY7" fmla="*/ 48101 h 276225"/>
-                <a:gd name="connsiteX8" fmla="*/ 204311 w 400050"/>
-                <a:gd name="connsiteY8" fmla="*/ 115729 h 276225"/>
-                <a:gd name="connsiteX9" fmla="*/ 237649 w 400050"/>
-                <a:gd name="connsiteY9" fmla="*/ 115729 h 276225"/>
-                <a:gd name="connsiteX10" fmla="*/ 187166 w 400050"/>
-                <a:gd name="connsiteY10" fmla="*/ 175736 h 276225"/>
-                <a:gd name="connsiteX11" fmla="*/ 135731 w 400050"/>
-                <a:gd name="connsiteY11" fmla="*/ 115729 h 276225"/>
-                <a:gd name="connsiteX12" fmla="*/ 170021 w 400050"/>
-                <a:gd name="connsiteY12" fmla="*/ 115729 h 276225"/>
-                <a:gd name="connsiteX13" fmla="*/ 210026 w 400050"/>
-                <a:gd name="connsiteY13" fmla="*/ 23336 h 276225"/>
-                <a:gd name="connsiteX14" fmla="*/ 154781 w 400050"/>
-                <a:gd name="connsiteY14" fmla="*/ 7144 h 276225"/>
-                <a:gd name="connsiteX15" fmla="*/ 52864 w 400050"/>
-                <a:gd name="connsiteY15" fmla="*/ 107156 h 276225"/>
-                <a:gd name="connsiteX16" fmla="*/ 52864 w 400050"/>
-                <a:gd name="connsiteY16" fmla="*/ 117634 h 276225"/>
-                <a:gd name="connsiteX17" fmla="*/ 7144 w 400050"/>
-                <a:gd name="connsiteY17" fmla="*/ 188119 h 276225"/>
-                <a:gd name="connsiteX18" fmla="*/ 94774 w 400050"/>
-                <a:gd name="connsiteY18" fmla="*/ 271939 h 276225"/>
-                <a:gd name="connsiteX19" fmla="*/ 310991 w 400050"/>
-                <a:gd name="connsiteY19" fmla="*/ 271939 h 276225"/>
-                <a:gd name="connsiteX20" fmla="*/ 398621 w 400050"/>
-                <a:gd name="connsiteY20" fmla="*/ 188119 h 276225"/>
-                <a:gd name="connsiteX21" fmla="*/ 354806 w 400050"/>
-                <a:gd name="connsiteY21" fmla="*/ 119539 h 276225"/>
-              </a:gdLst>
-              <a:ahLst/>
-              <a:cxnLst>
-                <a:cxn ang="0">
-                  <a:pos x="connsiteX0" y="connsiteY0"/>
-                </a:cxn>
-                <a:cxn ang="0">
-                  <a:pos x="connsiteX1" y="connsiteY1"/>
-                </a:cxn>
-                <a:cxn ang="0">
-                  <a:pos x="connsiteX2" y="connsiteY2"/>
-                </a:cxn>
-                <a:cxn ang="0">
-                  <a:pos x="connsiteX3" y="connsiteY3"/>
-                </a:cxn>
-                <a:cxn ang="0">
-                  <a:pos x="connsiteX4" y="connsiteY4"/>
-                </a:cxn>
-                <a:cxn ang="0">
-                  <a:pos x="connsiteX5" y="connsiteY5"/>
-                </a:cxn>
-                <a:cxn ang="0">
-                  <a:pos x="connsiteX6" y="connsiteY6"/>
-                </a:cxn>
-                <a:cxn ang="0">
-                  <a:pos x="connsiteX7" y="connsiteY7"/>
-                </a:cxn>
-                <a:cxn ang="0">
-                  <a:pos x="connsiteX8" y="connsiteY8"/>
-                </a:cxn>
-                <a:cxn ang="0">
-                  <a:pos x="connsiteX9" y="connsiteY9"/>
-                </a:cxn>
-                <a:cxn ang="0">
-                  <a:pos x="connsiteX10" y="connsiteY10"/>
-                </a:cxn>
-                <a:cxn ang="0">
-                  <a:pos x="connsiteX11" y="connsiteY11"/>
-                </a:cxn>
-                <a:cxn ang="0">
-                  <a:pos x="connsiteX12" y="connsiteY12"/>
-                </a:cxn>
-                <a:cxn ang="0">
-                  <a:pos x="connsiteX13" y="connsiteY13"/>
-                </a:cxn>
-                <a:cxn ang="0">
-                  <a:pos x="connsiteX14" y="connsiteY14"/>
-                </a:cxn>
-                <a:cxn ang="0">
-                  <a:pos x="connsiteX15" y="connsiteY15"/>
-                </a:cxn>
-                <a:cxn ang="0">
-                  <a:pos x="connsiteX16" y="connsiteY16"/>
-                </a:cxn>
-                <a:cxn ang="0">
-                  <a:pos x="connsiteX17" y="connsiteY17"/>
-                </a:cxn>
-                <a:cxn ang="0">
-                  <a:pos x="connsiteX18" y="connsiteY18"/>
-                </a:cxn>
-                <a:cxn ang="0">
-                  <a:pos x="connsiteX19" y="connsiteY19"/>
-                </a:cxn>
-                <a:cxn ang="0">
-                  <a:pos x="connsiteX20" y="connsiteY20"/>
-                </a:cxn>
-                <a:cxn ang="0">
-                  <a:pos x="connsiteX21" y="connsiteY21"/>
-                </a:cxn>
-              </a:cxnLst>
-              <a:rect l="l" t="t" r="r" b="b"/>
-              <a:pathLst>
-                <a:path w="400050" h="276225">
-                  <a:moveTo>
-                    <a:pt x="354806" y="119539"/>
-                  </a:moveTo>
-                  <a:lnTo>
-                    <a:pt x="354806" y="113824"/>
-                  </a:lnTo>
-                  <a:cubicBezTo>
-                    <a:pt x="354806" y="71914"/>
-                    <a:pt x="320516" y="37624"/>
-                    <a:pt x="278606" y="37624"/>
-                  </a:cubicBezTo>
-                  <a:cubicBezTo>
-                    <a:pt x="265271" y="37624"/>
-                    <a:pt x="252889" y="41434"/>
-                    <a:pt x="241459" y="47149"/>
-                  </a:cubicBezTo>
-                  <a:lnTo>
-                    <a:pt x="241459" y="48101"/>
-                  </a:lnTo>
-                  <a:lnTo>
-                    <a:pt x="241459" y="47149"/>
-                  </a:lnTo>
-                  <a:cubicBezTo>
-                    <a:pt x="240506" y="48101"/>
-                    <a:pt x="238601" y="48101"/>
-                    <a:pt x="237649" y="49054"/>
-                  </a:cubicBezTo>
-                  <a:cubicBezTo>
-                    <a:pt x="237649" y="49054"/>
-                    <a:pt x="237649" y="49054"/>
-                    <a:pt x="236696" y="48101"/>
-                  </a:cubicBezTo>
-                  <a:cubicBezTo>
-                    <a:pt x="214789" y="64294"/>
-                    <a:pt x="205264" y="89059"/>
-                    <a:pt x="204311" y="115729"/>
-                  </a:cubicBezTo>
-                  <a:lnTo>
-                    <a:pt x="237649" y="115729"/>
-                  </a:lnTo>
-                  <a:lnTo>
-                    <a:pt x="187166" y="175736"/>
-                  </a:lnTo>
-                  <a:lnTo>
-                    <a:pt x="135731" y="115729"/>
-                  </a:lnTo>
-                  <a:lnTo>
-                    <a:pt x="170021" y="115729"/>
-                  </a:lnTo>
-                  <a:cubicBezTo>
-                    <a:pt x="170974" y="79534"/>
-                    <a:pt x="185261" y="45244"/>
-                    <a:pt x="210026" y="23336"/>
-                  </a:cubicBezTo>
-                  <a:cubicBezTo>
-                    <a:pt x="193834" y="12859"/>
-                    <a:pt x="174784" y="7144"/>
-                    <a:pt x="154781" y="7144"/>
-                  </a:cubicBezTo>
-                  <a:cubicBezTo>
-                    <a:pt x="98584" y="7144"/>
-                    <a:pt x="52864" y="51911"/>
-                    <a:pt x="52864" y="107156"/>
-                  </a:cubicBezTo>
-                  <a:cubicBezTo>
-                    <a:pt x="52864" y="110966"/>
-                    <a:pt x="52864" y="113824"/>
-                    <a:pt x="52864" y="117634"/>
-                  </a:cubicBezTo>
-                  <a:cubicBezTo>
-                    <a:pt x="24289" y="131921"/>
-                    <a:pt x="7144" y="156686"/>
-                    <a:pt x="7144" y="188119"/>
-                  </a:cubicBezTo>
-                  <a:cubicBezTo>
-                    <a:pt x="7144" y="235744"/>
-                    <a:pt x="45244" y="271939"/>
-                    <a:pt x="94774" y="271939"/>
-                  </a:cubicBezTo>
-                  <a:lnTo>
-                    <a:pt x="310991" y="271939"/>
-                  </a:lnTo>
-                  <a:cubicBezTo>
-                    <a:pt x="360521" y="271939"/>
-                    <a:pt x="398621" y="234791"/>
-                    <a:pt x="398621" y="188119"/>
-                  </a:cubicBezTo>
-                  <a:cubicBezTo>
-                    <a:pt x="398621" y="157639"/>
-                    <a:pt x="383381" y="133826"/>
-                    <a:pt x="354806" y="119539"/>
-                  </a:cubicBezTo>
-                  <a:close/>
-                </a:path>
-              </a:pathLst>
-            </a:custGeom>
-            <a:grpFill/>
-            <a:ln w="9525" cap="flat">
-              <a:noFill/>
-              <a:prstDash val="solid"/>
-              <a:miter/>
-            </a:ln>
-          </p:spPr>
-          <p:txBody>
-            <a:bodyPr rtlCol="0" anchor="ctr"/>
-            <a:lstStyle/>
-            <a:p>
-              <a:endParaRPr lang="en-IE" dirty="0"/>
-            </a:p>
-          </p:txBody>
-        </p:sp>
-      </p:grpSp>
       <p:sp>
         <p:nvSpPr>
           <p:cNvPr id="38" name="Freeform: Shape 37" descr="Azure Migrate icon">
@@ -18591,455 +17619,600 @@
           </a:p>
         </p:txBody>
       </p:sp>
-      <p:grpSp>
-        <p:nvGrpSpPr>
-          <p:cNvPr id="34" name="Group 33">
+      <p:sp>
+        <p:nvSpPr>
+          <p:cNvPr id="113" name="Rectangle 112">
             <a:extLst>
               <a:ext uri="{FF2B5EF4-FFF2-40B4-BE49-F238E27FC236}">
-                <a16:creationId xmlns:a16="http://schemas.microsoft.com/office/drawing/2014/main" id="{997CC66D-6945-4576-9B04-E28B09D23B44}"/>
-              </a:ext>
-              <a:ext uri="{C183D7F6-B498-43B3-948B-1728B52AA6E4}">
-                <adec:decorative xmlns:adec="http://schemas.microsoft.com/office/drawing/2017/decorative" val="0"/>
+                <a16:creationId xmlns:a16="http://schemas.microsoft.com/office/drawing/2014/main" id="{4F520B2D-2C19-4866-A54B-7EC98B7C02B7}"/>
               </a:ext>
             </a:extLst>
           </p:cNvPr>
-          <p:cNvGrpSpPr/>
+          <p:cNvSpPr/>
           <p:nvPr/>
-        </p:nvGrpSpPr>
-        <p:grpSpPr>
+        </p:nvSpPr>
+        <p:spPr bwMode="auto">
           <a:xfrm>
-            <a:off x="9291981" y="1943230"/>
-            <a:ext cx="838200" cy="785969"/>
-            <a:chOff x="8403167" y="1712360"/>
-            <a:chExt cx="838200" cy="785969"/>
+            <a:off x="788751" y="3021032"/>
+            <a:ext cx="3096077" cy="689363"/>
           </a:xfrm>
-        </p:grpSpPr>
-        <p:sp>
-          <p:nvSpPr>
-            <p:cNvPr id="45" name="Freeform: Shape 44">
-              <a:extLst>
-                <a:ext uri="{FF2B5EF4-FFF2-40B4-BE49-F238E27FC236}">
-                  <a16:creationId xmlns:a16="http://schemas.microsoft.com/office/drawing/2014/main" id="{F8E37644-4F31-488E-B097-A444EF00FA5F}"/>
-                </a:ext>
-              </a:extLst>
-            </p:cNvPr>
-            <p:cNvSpPr/>
-            <p:nvPr/>
-          </p:nvSpPr>
-          <p:spPr bwMode="auto">
-            <a:xfrm>
-              <a:off x="8403167" y="1712360"/>
-              <a:ext cx="838200" cy="539773"/>
-            </a:xfrm>
-            <a:custGeom>
+          <a:prstGeom prst="rect">
+            <a:avLst/>
+          </a:prstGeom>
+          <a:solidFill>
+            <a:srgbClr val="FFFFFF"/>
+          </a:solidFill>
+          <a:ln w="25400" cap="flat" cmpd="sng" algn="ctr">
+            <a:noFill/>
+            <a:prstDash val="solid"/>
+            <a:headEnd type="none" w="med" len="med"/>
+            <a:tailEnd type="none" w="med" len="med"/>
+          </a:ln>
+          <a:effectLst/>
+        </p:spPr>
+        <p:txBody>
+          <a:bodyPr vert="horz" wrap="square" lIns="182854" tIns="91427" rIns="91427" bIns="91427" numCol="1" rtlCol="0" anchor="ctr" anchorCtr="0" compatLnSpc="1">
+            <a:prstTxWarp prst="textNoShape">
               <a:avLst/>
-              <a:gdLst>
-                <a:gd name="connsiteX0" fmla="*/ 433194 w 838200"/>
-                <a:gd name="connsiteY0" fmla="*/ 0 h 539773"/>
-                <a:gd name="connsiteX1" fmla="*/ 650346 w 838200"/>
-                <a:gd name="connsiteY1" fmla="*/ 129061 h 539773"/>
-                <a:gd name="connsiteX2" fmla="*/ 663400 w 838200"/>
-                <a:gd name="connsiteY2" fmla="*/ 187038 h 539773"/>
-                <a:gd name="connsiteX3" fmla="*/ 721851 w 838200"/>
-                <a:gd name="connsiteY3" fmla="*/ 198055 h 539773"/>
-                <a:gd name="connsiteX4" fmla="*/ 838200 w 838200"/>
-                <a:gd name="connsiteY4" fmla="*/ 361926 h 539773"/>
-                <a:gd name="connsiteX5" fmla="*/ 647700 w 838200"/>
-                <a:gd name="connsiteY5" fmla="*/ 539773 h 539773"/>
-                <a:gd name="connsiteX6" fmla="*/ 472170 w 838200"/>
-                <a:gd name="connsiteY6" fmla="*/ 431152 h 539773"/>
-                <a:gd name="connsiteX7" fmla="*/ 469615 w 838200"/>
-                <a:gd name="connsiteY7" fmla="*/ 419336 h 539773"/>
-                <a:gd name="connsiteX8" fmla="*/ 433194 w 838200"/>
-                <a:gd name="connsiteY8" fmla="*/ 422628 h 539773"/>
-                <a:gd name="connsiteX9" fmla="*/ 341460 w 838200"/>
-                <a:gd name="connsiteY9" fmla="*/ 406022 h 539773"/>
-                <a:gd name="connsiteX10" fmla="*/ 295683 w 838200"/>
-                <a:gd name="connsiteY10" fmla="*/ 378348 h 539773"/>
-                <a:gd name="connsiteX11" fmla="*/ 245971 w 838200"/>
-                <a:gd name="connsiteY11" fmla="*/ 409638 h 539773"/>
-                <a:gd name="connsiteX12" fmla="*/ 177054 w 838200"/>
-                <a:gd name="connsiteY12" fmla="*/ 422628 h 539773"/>
-                <a:gd name="connsiteX13" fmla="*/ 0 w 838200"/>
-                <a:gd name="connsiteY13" fmla="*/ 257334 h 539773"/>
-                <a:gd name="connsiteX14" fmla="*/ 177054 w 838200"/>
-                <a:gd name="connsiteY14" fmla="*/ 92040 h 539773"/>
-                <a:gd name="connsiteX15" fmla="*/ 235585 w 838200"/>
-                <a:gd name="connsiteY15" fmla="*/ 103072 h 539773"/>
-                <a:gd name="connsiteX16" fmla="*/ 266549 w 838200"/>
-                <a:gd name="connsiteY16" fmla="*/ 61893 h 539773"/>
-                <a:gd name="connsiteX17" fmla="*/ 433194 w 838200"/>
-                <a:gd name="connsiteY17" fmla="*/ 0 h 539773"/>
-              </a:gdLst>
-              <a:ahLst/>
-              <a:cxnLst>
-                <a:cxn ang="0">
-                  <a:pos x="connsiteX0" y="connsiteY0"/>
-                </a:cxn>
-                <a:cxn ang="0">
-                  <a:pos x="connsiteX1" y="connsiteY1"/>
-                </a:cxn>
-                <a:cxn ang="0">
-                  <a:pos x="connsiteX2" y="connsiteY2"/>
-                </a:cxn>
-                <a:cxn ang="0">
-                  <a:pos x="connsiteX3" y="connsiteY3"/>
-                </a:cxn>
-                <a:cxn ang="0">
-                  <a:pos x="connsiteX4" y="connsiteY4"/>
-                </a:cxn>
-                <a:cxn ang="0">
-                  <a:pos x="connsiteX5" y="connsiteY5"/>
-                </a:cxn>
-                <a:cxn ang="0">
-                  <a:pos x="connsiteX6" y="connsiteY6"/>
-                </a:cxn>
-                <a:cxn ang="0">
-                  <a:pos x="connsiteX7" y="connsiteY7"/>
-                </a:cxn>
-                <a:cxn ang="0">
-                  <a:pos x="connsiteX8" y="connsiteY8"/>
-                </a:cxn>
-                <a:cxn ang="0">
-                  <a:pos x="connsiteX9" y="connsiteY9"/>
-                </a:cxn>
-                <a:cxn ang="0">
-                  <a:pos x="connsiteX10" y="connsiteY10"/>
-                </a:cxn>
-                <a:cxn ang="0">
-                  <a:pos x="connsiteX11" y="connsiteY11"/>
-                </a:cxn>
-                <a:cxn ang="0">
-                  <a:pos x="connsiteX12" y="connsiteY12"/>
-                </a:cxn>
-                <a:cxn ang="0">
-                  <a:pos x="connsiteX13" y="connsiteY13"/>
-                </a:cxn>
-                <a:cxn ang="0">
-                  <a:pos x="connsiteX14" y="connsiteY14"/>
-                </a:cxn>
-                <a:cxn ang="0">
-                  <a:pos x="connsiteX15" y="connsiteY15"/>
-                </a:cxn>
-                <a:cxn ang="0">
-                  <a:pos x="connsiteX16" y="connsiteY16"/>
-                </a:cxn>
-                <a:cxn ang="0">
-                  <a:pos x="connsiteX17" y="connsiteY17"/>
-                </a:cxn>
-              </a:cxnLst>
-              <a:rect l="l" t="t" r="r" b="b"/>
-              <a:pathLst>
-                <a:path w="838200" h="539773">
-                  <a:moveTo>
-                    <a:pt x="433194" y="0"/>
-                  </a:moveTo>
-                  <a:cubicBezTo>
-                    <a:pt x="530813" y="0"/>
-                    <a:pt x="614569" y="53218"/>
-                    <a:pt x="650346" y="129061"/>
-                  </a:cubicBezTo>
-                  <a:lnTo>
-                    <a:pt x="663400" y="187038"/>
-                  </a:lnTo>
-                  <a:lnTo>
-                    <a:pt x="721851" y="198055"/>
-                  </a:lnTo>
-                  <a:cubicBezTo>
-                    <a:pt x="790224" y="225054"/>
-                    <a:pt x="838200" y="288260"/>
-                    <a:pt x="838200" y="361926"/>
-                  </a:cubicBezTo>
-                  <a:cubicBezTo>
-                    <a:pt x="838200" y="460148"/>
-                    <a:pt x="752910" y="539773"/>
-                    <a:pt x="647700" y="539773"/>
-                  </a:cubicBezTo>
-                  <a:cubicBezTo>
-                    <a:pt x="568792" y="539773"/>
-                    <a:pt x="501090" y="494984"/>
-                    <a:pt x="472170" y="431152"/>
-                  </a:cubicBezTo>
-                  <a:lnTo>
-                    <a:pt x="469615" y="419336"/>
-                  </a:lnTo>
-                  <a:lnTo>
-                    <a:pt x="433194" y="422628"/>
-                  </a:lnTo>
-                  <a:cubicBezTo>
-                    <a:pt x="400655" y="422628"/>
-                    <a:pt x="369655" y="416715"/>
-                    <a:pt x="341460" y="406022"/>
-                  </a:cubicBezTo>
-                  <a:lnTo>
-                    <a:pt x="295683" y="378348"/>
-                  </a:lnTo>
-                  <a:lnTo>
-                    <a:pt x="245971" y="409638"/>
-                  </a:lnTo>
-                  <a:cubicBezTo>
-                    <a:pt x="224789" y="418003"/>
-                    <a:pt x="201500" y="422628"/>
-                    <a:pt x="177054" y="422628"/>
-                  </a:cubicBezTo>
-                  <a:cubicBezTo>
-                    <a:pt x="79270" y="422628"/>
-                    <a:pt x="0" y="348623"/>
-                    <a:pt x="0" y="257334"/>
-                  </a:cubicBezTo>
-                  <a:cubicBezTo>
-                    <a:pt x="0" y="166045"/>
-                    <a:pt x="79270" y="92040"/>
-                    <a:pt x="177054" y="92040"/>
-                  </a:cubicBezTo>
-                  <a:lnTo>
-                    <a:pt x="235585" y="103072"/>
-                  </a:lnTo>
-                  <a:lnTo>
-                    <a:pt x="266549" y="61893"/>
-                  </a:lnTo>
-                  <a:cubicBezTo>
-                    <a:pt x="309197" y="23652"/>
-                    <a:pt x="368115" y="0"/>
-                    <a:pt x="433194" y="0"/>
-                  </a:cubicBezTo>
-                  <a:close/>
-                </a:path>
-              </a:pathLst>
-            </a:custGeom>
-            <a:solidFill>
-              <a:schemeClr val="tx1"/>
-            </a:solidFill>
-            <a:ln>
-              <a:noFill/>
-              <a:headEnd type="none" w="med" len="med"/>
-              <a:tailEnd type="none" w="med" len="med"/>
-            </a:ln>
-            <a:effectLst/>
-          </p:spPr>
-          <p:style>
-            <a:lnRef idx="1">
-              <a:schemeClr val="accent2"/>
-            </a:lnRef>
-            <a:fillRef idx="3">
-              <a:schemeClr val="accent2"/>
-            </a:fillRef>
-            <a:effectRef idx="2">
-              <a:schemeClr val="accent2"/>
-            </a:effectRef>
-            <a:fontRef idx="minor">
-              <a:schemeClr val="lt1"/>
-            </a:fontRef>
-          </p:style>
-          <p:txBody>
-            <a:bodyPr rot="0" spcFirstLastPara="0" vertOverflow="overflow" horzOverflow="overflow" vert="horz" wrap="square" lIns="182880" tIns="146304" rIns="182880" bIns="146304" numCol="1" spcCol="0" rtlCol="0" fromWordArt="0" anchor="t" anchorCtr="0" forceAA="0" compatLnSpc="1">
-              <a:prstTxWarp prst="textNoShape">
-                <a:avLst/>
-              </a:prstTxWarp>
-              <a:noAutofit/>
-            </a:bodyPr>
-            <a:lstStyle/>
-            <a:p>
-              <a:pPr algn="ctr" defTabSz="932472" fontAlgn="base">
-                <a:lnSpc>
-                  <a:spcPct val="90000"/>
-                </a:lnSpc>
-                <a:spcBef>
-                  <a:spcPct val="0"/>
-                </a:spcBef>
-                <a:spcAft>
-                  <a:spcPct val="0"/>
-                </a:spcAft>
-              </a:pPr>
-              <a:endParaRPr lang="en-IE" sz="2400" dirty="0">
-                <a:gradFill>
-                  <a:gsLst>
-                    <a:gs pos="0">
-                      <a:srgbClr val="FFFFFF"/>
-                    </a:gs>
-                    <a:gs pos="100000">
-                      <a:srgbClr val="FFFFFF"/>
-                    </a:gs>
-                  </a:gsLst>
-                  <a:lin ang="5400000" scaled="0"/>
-                </a:gradFill>
-                <a:ea typeface="Segoe UI" pitchFamily="34" charset="0"/>
-                <a:cs typeface="Segoe UI" pitchFamily="34" charset="0"/>
-              </a:endParaRPr>
-            </a:p>
-          </p:txBody>
-        </p:sp>
-        <p:sp>
-          <p:nvSpPr>
-            <p:cNvPr id="28" name="Flowchart: Magnetic Disk 27">
-              <a:extLst>
-                <a:ext uri="{FF2B5EF4-FFF2-40B4-BE49-F238E27FC236}">
-                  <a16:creationId xmlns:a16="http://schemas.microsoft.com/office/drawing/2014/main" id="{0191B5AE-F7BF-46D0-A9A6-18006531512D}"/>
-                </a:ext>
-              </a:extLst>
-            </p:cNvPr>
-            <p:cNvSpPr/>
-            <p:nvPr/>
-          </p:nvSpPr>
-          <p:spPr bwMode="auto">
-            <a:xfrm>
-              <a:off x="8602133" y="2004193"/>
-              <a:ext cx="440267" cy="494136"/>
-            </a:xfrm>
-            <a:prstGeom prst="flowChartMagneticDisk">
+            </a:prstTxWarp>
+          </a:bodyPr>
+          <a:lstStyle/>
+          <a:p>
+            <a:pPr marL="0" marR="0" lvl="0" indent="0" algn="ctr" defTabSz="913673" eaLnBrk="1" fontAlgn="auto" latinLnBrk="0" hangingPunct="1">
+              <a:lnSpc>
+                <a:spcPct val="100000"/>
+              </a:lnSpc>
+              <a:spcBef>
+                <a:spcPts val="2000"/>
+              </a:spcBef>
+              <a:spcAft>
+                <a:spcPts val="0"/>
+              </a:spcAft>
+              <a:buClrTx/>
+              <a:buSzTx/>
+              <a:buFontTx/>
+              <a:buNone/>
+              <a:tabLst/>
+              <a:defRPr/>
+            </a:pPr>
+            <a:r>
+              <a:rPr kumimoji="0" lang="en-US" sz="2000" b="0" i="0" u="none" strike="noStrike" kern="0" cap="none" spc="0" normalizeH="0" baseline="0" noProof="0" dirty="0">
+                <a:ln>
+                  <a:noFill/>
+                </a:ln>
+                <a:solidFill>
+                  <a:srgbClr val="000000"/>
+                </a:solidFill>
+                <a:effectLst/>
+                <a:uLnTx/>
+                <a:uFillTx/>
+                <a:latin typeface="Calibri"/>
+                <a:ea typeface="+mn-ea"/>
+                <a:cs typeface="+mn-cs"/>
+              </a:rPr>
+              <a:t>Azure Migrate</a:t>
+            </a:r>
+          </a:p>
+        </p:txBody>
+      </p:sp>
+      <p:sp>
+        <p:nvSpPr>
+          <p:cNvPr id="112" name="Rectangle 111">
+            <a:extLst>
+              <a:ext uri="{FF2B5EF4-FFF2-40B4-BE49-F238E27FC236}">
+                <a16:creationId xmlns:a16="http://schemas.microsoft.com/office/drawing/2014/main" id="{D5F78B83-BBD4-4544-8761-B7DAFF23088A}"/>
+              </a:ext>
+            </a:extLst>
+          </p:cNvPr>
+          <p:cNvSpPr/>
+          <p:nvPr/>
+        </p:nvSpPr>
+        <p:spPr bwMode="auto">
+          <a:xfrm>
+            <a:off x="788751" y="3941336"/>
+            <a:ext cx="3096077" cy="975520"/>
+          </a:xfrm>
+          <a:prstGeom prst="rect">
+            <a:avLst/>
+          </a:prstGeom>
+          <a:solidFill>
+            <a:srgbClr val="FFFFFF">
+              <a:lumMod val="95000"/>
+            </a:srgbClr>
+          </a:solidFill>
+          <a:ln w="25400" cap="flat" cmpd="sng" algn="ctr">
+            <a:noFill/>
+            <a:prstDash val="solid"/>
+            <a:headEnd type="none" w="med" len="med"/>
+            <a:tailEnd type="none" w="med" len="med"/>
+          </a:ln>
+          <a:effectLst/>
+        </p:spPr>
+        <p:txBody>
+          <a:bodyPr rot="0" spcFirstLastPara="0" vertOverflow="overflow" horzOverflow="overflow" vert="horz" wrap="square" lIns="108000" tIns="108000" rIns="108000" bIns="108000" numCol="1" spcCol="0" rtlCol="0" fromWordArt="0" anchor="t" anchorCtr="0" forceAA="0" compatLnSpc="1">
+            <a:prstTxWarp prst="textNoShape">
               <a:avLst/>
-            </a:prstGeom>
-            <a:solidFill>
-              <a:schemeClr val="tx1"/>
-            </a:solidFill>
-            <a:ln w="34925">
+            </a:prstTxWarp>
+            <a:noAutofit/>
+          </a:bodyPr>
+          <a:lstStyle/>
+          <a:p>
+            <a:pPr marL="0" marR="0" lvl="0" indent="0" defTabSz="896386" eaLnBrk="1" fontAlgn="auto" latinLnBrk="0" hangingPunct="1">
+              <a:lnSpc>
+                <a:spcPct val="100000"/>
+              </a:lnSpc>
+              <a:spcBef>
+                <a:spcPts val="2000"/>
+              </a:spcBef>
+              <a:spcAft>
+                <a:spcPts val="196"/>
+              </a:spcAft>
+              <a:buClrTx/>
+              <a:buSzTx/>
+              <a:buFontTx/>
+              <a:buNone/>
+              <a:tabLst/>
+              <a:defRPr/>
+            </a:pPr>
+            <a:r>
+              <a:rPr kumimoji="0" lang="en-US" sz="1400" b="0" i="0" u="none" strike="noStrike" kern="0" cap="none" spc="0" normalizeH="0" baseline="0" noProof="0" dirty="0">
+                <a:ln>
+                  <a:noFill/>
+                </a:ln>
+                <a:solidFill>
+                  <a:schemeClr val="bg1"/>
+                </a:solidFill>
+                <a:effectLst/>
+                <a:uLnTx/>
+                <a:uFillTx/>
+                <a:latin typeface="Calibri"/>
+                <a:ea typeface="+mn-ea"/>
+                <a:cs typeface="+mn-cs"/>
+              </a:rPr>
+              <a:t>Azure Migrate can </a:t>
+            </a:r>
+            <a:r>
+              <a:rPr lang="en-US" sz="1400" kern="0" dirty="0">
+                <a:solidFill>
+                  <a:schemeClr val="bg1"/>
+                </a:solidFill>
+                <a:latin typeface="Calibri"/>
+              </a:rPr>
+              <a:t>assess</a:t>
+            </a:r>
+            <a:r>
+              <a:rPr kumimoji="0" lang="en-US" sz="1400" b="0" i="0" u="none" strike="noStrike" kern="0" cap="none" spc="0" normalizeH="0" baseline="0" noProof="0" dirty="0">
+                <a:ln>
+                  <a:noFill/>
+                </a:ln>
+                <a:solidFill>
+                  <a:schemeClr val="bg1"/>
+                </a:solidFill>
+                <a:effectLst/>
+                <a:uLnTx/>
+                <a:uFillTx/>
+                <a:latin typeface="Calibri"/>
+                <a:ea typeface="+mn-ea"/>
+                <a:cs typeface="+mn-cs"/>
+              </a:rPr>
+              <a:t> your VMware environment for Azure suitability, sizing recommendations and cost estimates.</a:t>
+            </a:r>
+          </a:p>
+        </p:txBody>
+      </p:sp>
+      <p:pic>
+        <p:nvPicPr>
+          <p:cNvPr id="3" name="Picture 2" descr="Azure Site Recovery Icon">
+            <a:extLst>
+              <a:ext uri="{FF2B5EF4-FFF2-40B4-BE49-F238E27FC236}">
+                <a16:creationId xmlns:a16="http://schemas.microsoft.com/office/drawing/2014/main" id="{D2C84F97-EC3D-4433-AA6D-6E50D54D66AE}"/>
+              </a:ext>
+            </a:extLst>
+          </p:cNvPr>
+          <p:cNvPicPr>
+            <a:picLocks noChangeAspect="1"/>
+          </p:cNvPicPr>
+          <p:nvPr/>
+        </p:nvPicPr>
+        <p:blipFill>
+          <a:blip r:embed="rId3"/>
+          <a:stretch>
+            <a:fillRect/>
+          </a:stretch>
+        </p:blipFill>
+        <p:spPr>
+          <a:xfrm>
+            <a:off x="5238410" y="1288473"/>
+            <a:ext cx="1730761" cy="1599863"/>
+          </a:xfrm>
+          <a:prstGeom prst="rect">
+            <a:avLst/>
+          </a:prstGeom>
+        </p:spPr>
+      </p:pic>
+      <p:sp>
+        <p:nvSpPr>
+          <p:cNvPr id="114" name="Rectangle 113">
+            <a:extLst>
+              <a:ext uri="{FF2B5EF4-FFF2-40B4-BE49-F238E27FC236}">
+                <a16:creationId xmlns:a16="http://schemas.microsoft.com/office/drawing/2014/main" id="{B30574D1-FF21-4E16-A050-116BFB0D8B85}"/>
+              </a:ext>
+            </a:extLst>
+          </p:cNvPr>
+          <p:cNvSpPr/>
+          <p:nvPr/>
+        </p:nvSpPr>
+        <p:spPr bwMode="auto">
+          <a:xfrm>
+            <a:off x="4309902" y="3021032"/>
+            <a:ext cx="3096077" cy="689363"/>
+          </a:xfrm>
+          <a:prstGeom prst="rect">
+            <a:avLst/>
+          </a:prstGeom>
+          <a:solidFill>
+            <a:srgbClr val="FFFFFF"/>
+          </a:solidFill>
+          <a:ln w="25400" cap="flat" cmpd="sng" algn="ctr">
+            <a:noFill/>
+            <a:prstDash val="solid"/>
+            <a:headEnd type="none" w="med" len="med"/>
+            <a:tailEnd type="none" w="med" len="med"/>
+          </a:ln>
+          <a:effectLst/>
+        </p:spPr>
+        <p:txBody>
+          <a:bodyPr vert="horz" wrap="square" lIns="182854" tIns="91427" rIns="91427" bIns="91427" numCol="1" rtlCol="0" anchor="ctr" anchorCtr="0" compatLnSpc="1">
+            <a:prstTxWarp prst="textNoShape">
+              <a:avLst/>
+            </a:prstTxWarp>
+          </a:bodyPr>
+          <a:lstStyle/>
+          <a:p>
+            <a:pPr marL="0" marR="0" lvl="0" indent="0" algn="ctr" defTabSz="896386" eaLnBrk="1" fontAlgn="auto" latinLnBrk="0" hangingPunct="1">
+              <a:lnSpc>
+                <a:spcPct val="100000"/>
+              </a:lnSpc>
+              <a:spcBef>
+                <a:spcPts val="2000"/>
+              </a:spcBef>
+              <a:spcAft>
+                <a:spcPts val="0"/>
+              </a:spcAft>
+              <a:buClrTx/>
+              <a:buSzTx/>
+              <a:buFontTx/>
+              <a:buNone/>
+              <a:tabLst/>
+              <a:defRPr/>
+            </a:pPr>
+            <a:r>
+              <a:rPr kumimoji="0" lang="en-US" sz="2000" b="0" i="0" u="none" strike="noStrike" kern="0" cap="none" spc="0" normalizeH="0" baseline="0" noProof="0" dirty="0">
+                <a:ln>
+                  <a:noFill/>
+                </a:ln>
+                <a:solidFill>
+                  <a:srgbClr val="000000"/>
+                </a:solidFill>
+                <a:effectLst/>
+                <a:uLnTx/>
+                <a:uFillTx/>
+                <a:latin typeface="Calibri"/>
+                <a:ea typeface="+mn-ea"/>
+                <a:cs typeface="+mn-cs"/>
+              </a:rPr>
+              <a:t>Azure Site Recovery</a:t>
+            </a:r>
+          </a:p>
+        </p:txBody>
+      </p:sp>
+      <p:sp>
+        <p:nvSpPr>
+          <p:cNvPr id="115" name="Rectangle 114">
+            <a:extLst>
+              <a:ext uri="{FF2B5EF4-FFF2-40B4-BE49-F238E27FC236}">
+                <a16:creationId xmlns:a16="http://schemas.microsoft.com/office/drawing/2014/main" id="{3EDBA6EA-005B-4453-9C8F-333F84309D0D}"/>
+              </a:ext>
+            </a:extLst>
+          </p:cNvPr>
+          <p:cNvSpPr/>
+          <p:nvPr/>
+        </p:nvSpPr>
+        <p:spPr bwMode="auto">
+          <a:xfrm>
+            <a:off x="4309902" y="3941336"/>
+            <a:ext cx="3096077" cy="987462"/>
+          </a:xfrm>
+          <a:prstGeom prst="rect">
+            <a:avLst/>
+          </a:prstGeom>
+          <a:solidFill>
+            <a:srgbClr val="FFFFFF">
+              <a:lumMod val="95000"/>
+            </a:srgbClr>
+          </a:solidFill>
+          <a:ln w="25400" cap="flat" cmpd="sng" algn="ctr">
+            <a:noFill/>
+            <a:prstDash val="solid"/>
+            <a:headEnd type="none" w="med" len="med"/>
+            <a:tailEnd type="none" w="med" len="med"/>
+          </a:ln>
+          <a:effectLst/>
+        </p:spPr>
+        <p:txBody>
+          <a:bodyPr rot="0" spcFirstLastPara="0" vertOverflow="overflow" horzOverflow="overflow" vert="horz" wrap="square" lIns="108000" tIns="108000" rIns="108000" bIns="108000" numCol="1" spcCol="0" rtlCol="0" fromWordArt="0" anchor="t" anchorCtr="0" forceAA="0" compatLnSpc="1">
+            <a:prstTxWarp prst="textNoShape">
+              <a:avLst/>
+            </a:prstTxWarp>
+            <a:noAutofit/>
+          </a:bodyPr>
+          <a:lstStyle/>
+          <a:p>
+            <a:pPr lvl="0" defTabSz="896386">
+              <a:spcBef>
+                <a:spcPts val="2000"/>
+              </a:spcBef>
+              <a:spcAft>
+                <a:spcPts val="196"/>
+              </a:spcAft>
+              <a:defRPr/>
+            </a:pPr>
+            <a:r>
+              <a:rPr lang="en-US" sz="1400" kern="0" dirty="0">
+                <a:solidFill>
+                  <a:schemeClr val="bg1"/>
+                </a:solidFill>
+                <a:latin typeface="Calibri"/>
+              </a:rPr>
+              <a:t>Use Azure Site Recovery for disaster recovery or to migrate on-premises application to Azure.</a:t>
+            </a:r>
+          </a:p>
+        </p:txBody>
+      </p:sp>
+      <p:pic>
+        <p:nvPicPr>
+          <p:cNvPr id="4" name="Picture 3" descr="Azure Database Migration Service Icon">
+            <a:extLst>
+              <a:ext uri="{FF2B5EF4-FFF2-40B4-BE49-F238E27FC236}">
+                <a16:creationId xmlns:a16="http://schemas.microsoft.com/office/drawing/2014/main" id="{B9B39E5A-1C11-43D8-9F87-B51F4C261125}"/>
+              </a:ext>
+            </a:extLst>
+          </p:cNvPr>
+          <p:cNvPicPr>
+            <a:picLocks noChangeAspect="1"/>
+          </p:cNvPicPr>
+          <p:nvPr/>
+        </p:nvPicPr>
+        <p:blipFill>
+          <a:blip r:embed="rId4"/>
+          <a:stretch>
+            <a:fillRect/>
+          </a:stretch>
+        </p:blipFill>
+        <p:spPr>
+          <a:xfrm>
+            <a:off x="9107980" y="1545688"/>
+            <a:ext cx="1300032" cy="1158724"/>
+          </a:xfrm>
+          <a:prstGeom prst="rect">
+            <a:avLst/>
+          </a:prstGeom>
+        </p:spPr>
+      </p:pic>
+      <p:sp>
+        <p:nvSpPr>
+          <p:cNvPr id="116" name="Rectangle 115">
+            <a:extLst>
+              <a:ext uri="{FF2B5EF4-FFF2-40B4-BE49-F238E27FC236}">
+                <a16:creationId xmlns:a16="http://schemas.microsoft.com/office/drawing/2014/main" id="{D547B2E5-1BF1-43F3-997B-0258494DC449}"/>
+              </a:ext>
+            </a:extLst>
+          </p:cNvPr>
+          <p:cNvSpPr/>
+          <p:nvPr/>
+        </p:nvSpPr>
+        <p:spPr bwMode="auto">
+          <a:xfrm>
+            <a:off x="7831053" y="3021032"/>
+            <a:ext cx="3760057" cy="689363"/>
+          </a:xfrm>
+          <a:prstGeom prst="rect">
+            <a:avLst/>
+          </a:prstGeom>
+          <a:solidFill>
+            <a:srgbClr val="FFFFFF"/>
+          </a:solidFill>
+          <a:ln w="25400" cap="flat" cmpd="sng" algn="ctr">
+            <a:noFill/>
+            <a:prstDash val="solid"/>
+            <a:headEnd type="none" w="med" len="med"/>
+            <a:tailEnd type="none" w="med" len="med"/>
+          </a:ln>
+          <a:effectLst/>
+        </p:spPr>
+        <p:txBody>
+          <a:bodyPr vert="horz" wrap="square" lIns="182854" tIns="91427" rIns="91427" bIns="91427" numCol="1" rtlCol="0" anchor="ctr" anchorCtr="0" compatLnSpc="1">
+            <a:prstTxWarp prst="textNoShape">
+              <a:avLst/>
+            </a:prstTxWarp>
+          </a:bodyPr>
+          <a:lstStyle/>
+          <a:p>
+            <a:pPr marL="0" marR="0" lvl="0" indent="0" algn="ctr" defTabSz="896386" eaLnBrk="1" fontAlgn="auto" latinLnBrk="0" hangingPunct="1">
+              <a:lnSpc>
+                <a:spcPct val="100000"/>
+              </a:lnSpc>
+              <a:spcBef>
+                <a:spcPts val="2000"/>
+              </a:spcBef>
+              <a:spcAft>
+                <a:spcPts val="0"/>
+              </a:spcAft>
+              <a:buClrTx/>
+              <a:buSzTx/>
+              <a:buFontTx/>
+              <a:buNone/>
+              <a:tabLst/>
+              <a:defRPr/>
+            </a:pPr>
+            <a:r>
+              <a:rPr kumimoji="0" lang="en-US" b="0" i="0" u="none" strike="noStrike" kern="0" cap="none" spc="0" normalizeH="0" baseline="0" noProof="0" dirty="0">
+                <a:ln>
+                  <a:noFill/>
+                </a:ln>
+                <a:solidFill>
+                  <a:srgbClr val="000000"/>
+                </a:solidFill>
+                <a:effectLst/>
+                <a:uLnTx/>
+                <a:uFillTx/>
+                <a:latin typeface="Calibri"/>
+                <a:ea typeface="+mn-ea"/>
+                <a:cs typeface="+mn-cs"/>
+              </a:rPr>
+              <a:t>Azure Database Migration Service</a:t>
+            </a:r>
+            <a:br>
+              <a:rPr kumimoji="0" lang="en-US" b="0" i="0" u="none" strike="noStrike" kern="0" cap="none" spc="0" normalizeH="0" baseline="0" noProof="0" dirty="0">
+                <a:ln>
+                  <a:noFill/>
+                </a:ln>
+                <a:solidFill>
+                  <a:srgbClr val="000000"/>
+                </a:solidFill>
+                <a:effectLst/>
+                <a:uLnTx/>
+                <a:uFillTx/>
+                <a:latin typeface="Calibri"/>
+                <a:ea typeface="+mn-ea"/>
+                <a:cs typeface="+mn-cs"/>
+              </a:rPr>
+            </a:br>
+            <a:r>
+              <a:rPr lang="en-US" kern="0" dirty="0">
+                <a:solidFill>
+                  <a:srgbClr val="000000"/>
+                </a:solidFill>
+                <a:latin typeface="Calibri"/>
+              </a:rPr>
+              <a:t>Microsoft Data Migration Assistant</a:t>
+            </a:r>
+            <a:endParaRPr kumimoji="0" lang="en-US" b="0" i="0" u="none" strike="noStrike" kern="0" cap="none" spc="0" normalizeH="0" baseline="0" noProof="0" dirty="0">
+              <a:ln>
+                <a:noFill/>
+              </a:ln>
               <a:solidFill>
-                <a:srgbClr val="0078D7"/>
+                <a:srgbClr val="000000"/>
               </a:solidFill>
-              <a:headEnd type="none" w="med" len="med"/>
-              <a:tailEnd type="none" w="med" len="med"/>
-            </a:ln>
-            <a:effectLst/>
-          </p:spPr>
-          <p:style>
-            <a:lnRef idx="1">
-              <a:schemeClr val="accent2"/>
-            </a:lnRef>
-            <a:fillRef idx="3">
-              <a:schemeClr val="accent2"/>
-            </a:fillRef>
-            <a:effectRef idx="2">
-              <a:schemeClr val="accent2"/>
-            </a:effectRef>
-            <a:fontRef idx="minor">
-              <a:schemeClr val="lt1"/>
-            </a:fontRef>
-          </p:style>
-          <p:txBody>
-            <a:bodyPr rot="0" spcFirstLastPara="0" vertOverflow="overflow" horzOverflow="overflow" vert="horz" wrap="square" lIns="182880" tIns="146304" rIns="182880" bIns="146304" numCol="1" spcCol="0" rtlCol="0" fromWordArt="0" anchor="t" anchorCtr="0" forceAA="0" compatLnSpc="1">
-              <a:prstTxWarp prst="textNoShape">
-                <a:avLst/>
-              </a:prstTxWarp>
-              <a:noAutofit/>
-            </a:bodyPr>
-            <a:lstStyle/>
-            <a:p>
-              <a:pPr algn="ctr" defTabSz="932472" fontAlgn="base">
-                <a:lnSpc>
-                  <a:spcPct val="90000"/>
-                </a:lnSpc>
-                <a:spcBef>
-                  <a:spcPct val="0"/>
-                </a:spcBef>
-                <a:spcAft>
-                  <a:spcPct val="0"/>
-                </a:spcAft>
-              </a:pPr>
-              <a:endParaRPr lang="en-IE" sz="2400" dirty="0">
-                <a:gradFill>
-                  <a:gsLst>
-                    <a:gs pos="0">
-                      <a:srgbClr val="FFFFFF"/>
-                    </a:gs>
-                    <a:gs pos="100000">
-                      <a:srgbClr val="FFFFFF"/>
-                    </a:gs>
-                  </a:gsLst>
-                  <a:lin ang="5400000" scaled="0"/>
-                </a:gradFill>
-                <a:ea typeface="Segoe UI" pitchFamily="34" charset="0"/>
-                <a:cs typeface="Segoe UI" pitchFamily="34" charset="0"/>
-              </a:endParaRPr>
-            </a:p>
-          </p:txBody>
-        </p:sp>
-        <p:sp>
-          <p:nvSpPr>
-            <p:cNvPr id="32" name="Arrow: Right 31">
-              <a:extLst>
-                <a:ext uri="{FF2B5EF4-FFF2-40B4-BE49-F238E27FC236}">
-                  <a16:creationId xmlns:a16="http://schemas.microsoft.com/office/drawing/2014/main" id="{771C38CE-6F92-4948-84B9-122B409B91AB}"/>
-                </a:ext>
-              </a:extLst>
-            </p:cNvPr>
-            <p:cNvSpPr/>
-            <p:nvPr/>
-          </p:nvSpPr>
-          <p:spPr bwMode="auto">
-            <a:xfrm rot="16200000">
-              <a:off x="8686253" y="1846711"/>
-              <a:ext cx="272027" cy="222322"/>
-            </a:xfrm>
-            <a:prstGeom prst="rightArrow">
-              <a:avLst/>
-            </a:prstGeom>
-            <a:solidFill>
-              <a:srgbClr val="0078D7"/>
-            </a:solidFill>
-            <a:ln>
-              <a:noFill/>
-              <a:headEnd type="none" w="med" len="med"/>
-              <a:tailEnd type="none" w="med" len="med"/>
-            </a:ln>
-            <a:effectLst/>
-          </p:spPr>
-          <p:style>
-            <a:lnRef idx="1">
-              <a:schemeClr val="accent2"/>
-            </a:lnRef>
-            <a:fillRef idx="3">
-              <a:schemeClr val="accent2"/>
-            </a:fillRef>
-            <a:effectRef idx="2">
-              <a:schemeClr val="accent2"/>
-            </a:effectRef>
-            <a:fontRef idx="minor">
-              <a:schemeClr val="lt1"/>
-            </a:fontRef>
-          </p:style>
-          <p:txBody>
-            <a:bodyPr rot="0" spcFirstLastPara="0" vertOverflow="overflow" horzOverflow="overflow" vert="horz" wrap="square" lIns="182880" tIns="146304" rIns="182880" bIns="146304" numCol="1" spcCol="0" rtlCol="0" fromWordArt="0" anchor="t" anchorCtr="0" forceAA="0" compatLnSpc="1">
-              <a:prstTxWarp prst="textNoShape">
-                <a:avLst/>
-              </a:prstTxWarp>
-              <a:noAutofit/>
-            </a:bodyPr>
-            <a:lstStyle/>
-            <a:p>
-              <a:pPr algn="ctr" defTabSz="932472" fontAlgn="base">
-                <a:lnSpc>
-                  <a:spcPct val="90000"/>
-                </a:lnSpc>
-                <a:spcBef>
-                  <a:spcPct val="0"/>
-                </a:spcBef>
-                <a:spcAft>
-                  <a:spcPct val="0"/>
-                </a:spcAft>
-              </a:pPr>
-              <a:endParaRPr lang="en-IE" sz="2400" dirty="0">
-                <a:gradFill>
-                  <a:gsLst>
-                    <a:gs pos="0">
-                      <a:srgbClr val="FFFFFF"/>
-                    </a:gs>
-                    <a:gs pos="100000">
-                      <a:srgbClr val="FFFFFF"/>
-                    </a:gs>
-                  </a:gsLst>
-                  <a:lin ang="5400000" scaled="0"/>
-                </a:gradFill>
-                <a:ea typeface="Segoe UI" pitchFamily="34" charset="0"/>
-                <a:cs typeface="Segoe UI" pitchFamily="34" charset="0"/>
-              </a:endParaRPr>
-            </a:p>
-          </p:txBody>
-        </p:sp>
-      </p:grpSp>
+              <a:effectLst/>
+              <a:uLnTx/>
+              <a:uFillTx/>
+              <a:latin typeface="Calibri"/>
+              <a:ea typeface="+mn-ea"/>
+              <a:cs typeface="+mn-cs"/>
+            </a:endParaRPr>
+          </a:p>
+        </p:txBody>
+      </p:sp>
+      <p:sp>
+        <p:nvSpPr>
+          <p:cNvPr id="117" name="Rectangle 116">
+            <a:extLst>
+              <a:ext uri="{FF2B5EF4-FFF2-40B4-BE49-F238E27FC236}">
+                <a16:creationId xmlns:a16="http://schemas.microsoft.com/office/drawing/2014/main" id="{930BC2A8-BCCE-4B23-BC3B-74F51B7889CD}"/>
+              </a:ext>
+            </a:extLst>
+          </p:cNvPr>
+          <p:cNvSpPr/>
+          <p:nvPr/>
+        </p:nvSpPr>
+        <p:spPr>
+          <a:xfrm>
+            <a:off x="7831053" y="3941336"/>
+            <a:ext cx="3760057" cy="1819384"/>
+          </a:xfrm>
+          <a:prstGeom prst="rect">
+            <a:avLst/>
+          </a:prstGeom>
+          <a:solidFill>
+            <a:srgbClr val="FFFFFF">
+              <a:lumMod val="95000"/>
+            </a:srgbClr>
+          </a:solidFill>
+        </p:spPr>
+        <p:txBody>
+          <a:bodyPr vert="horz" wrap="square" lIns="108000" tIns="108000" rIns="108000" bIns="108000" anchor="t" anchorCtr="0">
+            <a:noAutofit/>
+          </a:bodyPr>
+          <a:lstStyle/>
+          <a:p>
+            <a:pPr marL="0" marR="0" lvl="0" indent="0" defTabSz="896386" eaLnBrk="1" fontAlgn="auto" latinLnBrk="0" hangingPunct="1">
+              <a:lnSpc>
+                <a:spcPct val="100000"/>
+              </a:lnSpc>
+              <a:spcBef>
+                <a:spcPts val="600"/>
+              </a:spcBef>
+              <a:spcAft>
+                <a:spcPts val="196"/>
+              </a:spcAft>
+              <a:buClrTx/>
+              <a:buSzTx/>
+              <a:buFontTx/>
+              <a:buNone/>
+              <a:tabLst/>
+              <a:defRPr/>
+            </a:pPr>
+            <a:r>
+              <a:rPr lang="en-US" sz="1400" kern="0" dirty="0">
+                <a:solidFill>
+                  <a:schemeClr val="bg1"/>
+                </a:solidFill>
+                <a:latin typeface="Calibri"/>
+              </a:rPr>
+              <a:t>Azure Database Migration Service migrates  on-premises database to Azure with minimal downtime.</a:t>
+            </a:r>
+          </a:p>
+          <a:p>
+            <a:pPr marL="0" marR="0" lvl="0" indent="0" defTabSz="896386" eaLnBrk="1" fontAlgn="auto" latinLnBrk="0" hangingPunct="1">
+              <a:lnSpc>
+                <a:spcPct val="100000"/>
+              </a:lnSpc>
+              <a:spcBef>
+                <a:spcPts val="600"/>
+              </a:spcBef>
+              <a:spcAft>
+                <a:spcPts val="196"/>
+              </a:spcAft>
+              <a:buClrTx/>
+              <a:buSzTx/>
+              <a:buFontTx/>
+              <a:buNone/>
+              <a:tabLst/>
+              <a:defRPr/>
+            </a:pPr>
+            <a:r>
+              <a:rPr kumimoji="0" lang="en-US" sz="1400" b="0" i="0" u="none" strike="noStrike" kern="0" cap="none" spc="0" normalizeH="0" baseline="0" noProof="0" dirty="0">
+                <a:ln>
+                  <a:noFill/>
+                </a:ln>
+                <a:solidFill>
+                  <a:schemeClr val="bg1"/>
+                </a:solidFill>
+                <a:effectLst/>
+                <a:uLnTx/>
+                <a:uFillTx/>
+                <a:latin typeface="Calibri"/>
+              </a:rPr>
+              <a:t>The Microsoft Data Migration Assistant supports the Database Migration Service by performing database compatibility assessments and schema migration.</a:t>
+            </a:r>
+          </a:p>
+        </p:txBody>
+      </p:sp>
     </p:spTree>
     <p:extLst>
       <p:ext uri="{BB962C8B-B14F-4D97-AF65-F5344CB8AC3E}">
-        <p14:creationId xmlns:p14="http://schemas.microsoft.com/office/powerpoint/2010/main" val="3609140050"/>
+        <p14:creationId xmlns:p14="http://schemas.microsoft.com/office/powerpoint/2010/main" val="1913539956"/>
       </p:ext>
     </p:extLst>
   </p:cSld>
@@ -25285,6 +24458,15 @@
 </file>
 
 <file path=customXml/item1.xml><?xml version="1.0" encoding="utf-8"?>
+<p:properties xmlns:p="http://schemas.microsoft.com/office/2006/metadata/properties" xmlns:xsi="http://www.w3.org/2001/XMLSchema-instance" xmlns:pc="http://schemas.microsoft.com/office/infopath/2007/PartnerControls">
+  <documentManagement>
+    <_ip_UnifiedCompliancePolicyUIAction xmlns="http://schemas.microsoft.com/sharepoint/v3" xsi:nil="true"/>
+    <_ip_UnifiedCompliancePolicyProperties xmlns="http://schemas.microsoft.com/sharepoint/v3" xsi:nil="true"/>
+  </documentManagement>
+</p:properties>
+</file>
+
+<file path=customXml/item2.xml><?xml version="1.0" encoding="utf-8"?>
 <ct:contentTypeSchema xmlns:ct="http://schemas.microsoft.com/office/2006/metadata/contentType" xmlns:ma="http://schemas.microsoft.com/office/2006/metadata/properties/metaAttributes" ct:_="" ma:_="" ma:contentTypeName="Document" ma:contentTypeID="0x010100D15DFA3690A15B4081582BBCC6BEAC3E" ma:contentTypeVersion="9" ma:contentTypeDescription="Create a new document." ma:contentTypeScope="" ma:versionID="642da1784587cbe85a7fdbbe4dc36103">
   <xsd:schema xmlns:xsd="http://www.w3.org/2001/XMLSchema" xmlns:xs="http://www.w3.org/2001/XMLSchema" xmlns:p="http://schemas.microsoft.com/office/2006/metadata/properties" xmlns:ns1="http://schemas.microsoft.com/sharepoint/v3" xmlns:ns2="2023ac63-7b75-4916-a9ee-591457758eee" xmlns:ns3="d9c797ad-d7c3-4982-82b7-81352a75e4a5" targetNamespace="http://schemas.microsoft.com/office/2006/metadata/properties" ma:root="true" ma:fieldsID="91198b0246576053cc55dd2c67035a89" ns1:_="" ns2:_="" ns3:_="">
     <xsd:import namespace="http://schemas.microsoft.com/sharepoint/v3"/>
@@ -25486,15 +24668,6 @@
 </ct:contentTypeSchema>
 </file>
 
-<file path=customXml/item2.xml><?xml version="1.0" encoding="utf-8"?>
-<p:properties xmlns:p="http://schemas.microsoft.com/office/2006/metadata/properties" xmlns:xsi="http://www.w3.org/2001/XMLSchema-instance" xmlns:pc="http://schemas.microsoft.com/office/infopath/2007/PartnerControls">
-  <documentManagement>
-    <_ip_UnifiedCompliancePolicyUIAction xmlns="http://schemas.microsoft.com/sharepoint/v3" xsi:nil="true"/>
-    <_ip_UnifiedCompliancePolicyProperties xmlns="http://schemas.microsoft.com/sharepoint/v3" xsi:nil="true"/>
-  </documentManagement>
-</p:properties>
-</file>
-
 <file path=customXml/item3.xml><?xml version="1.0" encoding="utf-8"?>
 <?mso-contentType ?>
 <FormTemplates xmlns="http://schemas.microsoft.com/sharepoint/v3/contenttype/forms">
@@ -25505,6 +24678,24 @@
 </file>
 
 <file path=customXml/itemProps1.xml><?xml version="1.0" encoding="utf-8"?>
+<ds:datastoreItem xmlns:ds="http://schemas.openxmlformats.org/officeDocument/2006/customXml" ds:itemID="{BAF7D529-36AB-45DA-B239-2F912F2D1610}">
+  <ds:schemaRefs>
+    <ds:schemaRef ds:uri="http://purl.org/dc/elements/1.1/"/>
+    <ds:schemaRef ds:uri="http://schemas.microsoft.com/office/2006/metadata/properties"/>
+    <ds:schemaRef ds:uri="http://purl.org/dc/dcmitype/"/>
+    <ds:schemaRef ds:uri="http://schemas.microsoft.com/sharepoint/v3"/>
+    <ds:schemaRef ds:uri="http://purl.org/dc/terms/"/>
+    <ds:schemaRef ds:uri="2023ac63-7b75-4916-a9ee-591457758eee"/>
+    <ds:schemaRef ds:uri="http://schemas.microsoft.com/office/2006/documentManagement/types"/>
+    <ds:schemaRef ds:uri="http://schemas.microsoft.com/office/infopath/2007/PartnerControls"/>
+    <ds:schemaRef ds:uri="http://schemas.openxmlformats.org/package/2006/metadata/core-properties"/>
+    <ds:schemaRef ds:uri="d9c797ad-d7c3-4982-82b7-81352a75e4a5"/>
+    <ds:schemaRef ds:uri="http://www.w3.org/XML/1998/namespace"/>
+  </ds:schemaRefs>
+</ds:datastoreItem>
+</file>
+
+<file path=customXml/itemProps2.xml><?xml version="1.0" encoding="utf-8"?>
 <ds:datastoreItem xmlns:ds="http://schemas.openxmlformats.org/officeDocument/2006/customXml" ds:itemID="{255F5BEB-6AD6-480A-8556-C80C5EBC10F2}">
   <ds:schemaRefs>
     <ds:schemaRef ds:uri="http://schemas.microsoft.com/office/2006/metadata/contentType"/>
@@ -25524,24 +24715,6 @@
 </ds:datastoreItem>
 </file>
 
-<file path=customXml/itemProps2.xml><?xml version="1.0" encoding="utf-8"?>
-<ds:datastoreItem xmlns:ds="http://schemas.openxmlformats.org/officeDocument/2006/customXml" ds:itemID="{BAF7D529-36AB-45DA-B239-2F912F2D1610}">
-  <ds:schemaRefs>
-    <ds:schemaRef ds:uri="http://purl.org/dc/elements/1.1/"/>
-    <ds:schemaRef ds:uri="http://schemas.microsoft.com/office/2006/metadata/properties"/>
-    <ds:schemaRef ds:uri="http://purl.org/dc/dcmitype/"/>
-    <ds:schemaRef ds:uri="http://schemas.microsoft.com/sharepoint/v3"/>
-    <ds:schemaRef ds:uri="http://purl.org/dc/terms/"/>
-    <ds:schemaRef ds:uri="2023ac63-7b75-4916-a9ee-591457758eee"/>
-    <ds:schemaRef ds:uri="http://schemas.microsoft.com/office/2006/documentManagement/types"/>
-    <ds:schemaRef ds:uri="http://schemas.microsoft.com/office/infopath/2007/PartnerControls"/>
-    <ds:schemaRef ds:uri="http://schemas.openxmlformats.org/package/2006/metadata/core-properties"/>
-    <ds:schemaRef ds:uri="d9c797ad-d7c3-4982-82b7-81352a75e4a5"/>
-    <ds:schemaRef ds:uri="http://www.w3.org/XML/1998/namespace"/>
-  </ds:schemaRefs>
-</ds:datastoreItem>
-</file>
-
 <file path=customXml/itemProps3.xml><?xml version="1.0" encoding="utf-8"?>
 <ds:datastoreItem xmlns:ds="http://schemas.openxmlformats.org/officeDocument/2006/customXml" ds:itemID="{F18501AF-04CF-4482-BAE1-607B49DDC378}">
   <ds:schemaRefs>

</xml_diff>

<commit_message>
HOL and WDS updates
</commit_message>
<xml_diff>
--- a/Whiteboard design session/WDS trainer presentation - Line-of-business application migration.pptx
+++ b/Whiteboard design session/WDS trainer presentation - Line-of-business application migration.pptx
@@ -231,7 +231,7 @@
           <a:p>
             <a:fld id="{52A13B17-C506-4D51-BB37-16B365906619}" type="datetimeFigureOut">
               <a:rPr lang="en-US" smtClean="0"/>
-              <a:t>5/27/2019</a:t>
+              <a:t>8/6/2019</a:t>
             </a:fld>
             <a:endParaRPr lang="en-US" dirty="0"/>
           </a:p>
@@ -1358,6 +1358,15 @@
           <a:bodyPr/>
           <a:lstStyle/>
           <a:p>
+            <a:r>
+              <a:rPr lang="en-US" dirty="0"/>
+              <a:t>Agentless vs agent-based comparison for VMware: https://docs.microsoft.com/azure/migrate/server-migrate-overview</a:t>
+            </a:r>
+          </a:p>
+          <a:p>
+            <a:endParaRPr lang="en-US" dirty="0"/>
+          </a:p>
+          <a:p>
             <a:endParaRPr lang="en-US" dirty="0"/>
           </a:p>
         </p:txBody>
@@ -1447,15 +1456,6 @@
           <a:p>
             <a:endParaRPr lang="en-IE" dirty="0"/>
           </a:p>
-          <a:p>
-            <a:endParaRPr lang="en-IE" dirty="0"/>
-          </a:p>
-          <a:p>
-            <a:r>
-              <a:rPr lang="en-IE" dirty="0"/>
-              <a:t>Free for 180 days. Must use a dedicated Log Analytics workspace. No solution other than Service Map may be used with this workspace.</a:t>
-            </a:r>
-          </a:p>
         </p:txBody>
       </p:sp>
       <p:sp>
@@ -1532,7 +1532,7 @@
           <a:p>
             <a:fld id="{386CE63F-9E7F-4C04-9D0D-FCA25A8E9E86}" type="datetime8">
               <a:rPr lang="en-US" smtClean="0"/>
-              <a:t>5/27/2019 10:24 AM</a:t>
+              <a:t>8/6/2019 10:28 AM</a:t>
             </a:fld>
             <a:endParaRPr lang="en-US" dirty="0"/>
           </a:p>
@@ -1708,15 +1708,6 @@
           <a:p>
             <a:endParaRPr lang="en-IE" dirty="0"/>
           </a:p>
-          <a:p>
-            <a:endParaRPr lang="en-IE" dirty="0"/>
-          </a:p>
-          <a:p>
-            <a:r>
-              <a:rPr lang="en-IE" dirty="0"/>
-              <a:t>Free for 180 days. Must use a dedicated Log Analytics workspace. No solution other than Service Map may be used with this workspace.</a:t>
-            </a:r>
-          </a:p>
         </p:txBody>
       </p:sp>
       <p:sp>
@@ -1793,7 +1784,7 @@
           <a:p>
             <a:fld id="{386CE63F-9E7F-4C04-9D0D-FCA25A8E9E86}" type="datetime8">
               <a:rPr lang="en-US" smtClean="0"/>
-              <a:t>5/27/2019 10:24 AM</a:t>
+              <a:t>8/6/2019 10:28 AM</a:t>
             </a:fld>
             <a:endParaRPr lang="en-US" dirty="0"/>
           </a:p>
@@ -1970,7 +1961,7 @@
           <a:p>
             <a:fld id="{386CE63F-9E7F-4C04-9D0D-FCA25A8E9E86}" type="datetime8">
               <a:rPr lang="en-US" smtClean="0"/>
-              <a:t>5/27/2019 10:24 AM</a:t>
+              <a:t>8/6/2019 10:28 AM</a:t>
             </a:fld>
             <a:endParaRPr lang="en-US" dirty="0"/>
           </a:p>
@@ -2062,15 +2053,6 @@
           <a:p>
             <a:endParaRPr lang="en-IE" dirty="0"/>
           </a:p>
-          <a:p>
-            <a:endParaRPr lang="en-IE" dirty="0"/>
-          </a:p>
-          <a:p>
-            <a:r>
-              <a:rPr lang="en-IE" dirty="0"/>
-              <a:t>Free for 180 days. Must use a dedicated Log Analytics workspace. No solution other than Service Map may be used with this workspace.</a:t>
-            </a:r>
-          </a:p>
         </p:txBody>
       </p:sp>
       <p:sp>
@@ -2147,7 +2129,7 @@
           <a:p>
             <a:fld id="{386CE63F-9E7F-4C04-9D0D-FCA25A8E9E86}" type="datetime8">
               <a:rPr lang="en-US" smtClean="0"/>
-              <a:t>5/27/2019 10:24 AM</a:t>
+              <a:t>8/6/2019 10:28 AM</a:t>
             </a:fld>
             <a:endParaRPr lang="en-US" dirty="0"/>
           </a:p>
@@ -2324,7 +2306,7 @@
           <a:p>
             <a:fld id="{386CE63F-9E7F-4C04-9D0D-FCA25A8E9E86}" type="datetime8">
               <a:rPr lang="en-US" smtClean="0"/>
-              <a:t>5/27/2019 10:24 AM</a:t>
+              <a:t>8/6/2019 10:28 AM</a:t>
             </a:fld>
             <a:endParaRPr lang="en-US" dirty="0"/>
           </a:p>
@@ -2501,7 +2483,7 @@
           <a:p>
             <a:fld id="{386CE63F-9E7F-4C04-9D0D-FCA25A8E9E86}" type="datetime8">
               <a:rPr lang="en-US" smtClean="0"/>
-              <a:t>5/27/2019 10:24 AM</a:t>
+              <a:t>8/6/2019 10:28 AM</a:t>
             </a:fld>
             <a:endParaRPr lang="en-US" dirty="0"/>
           </a:p>
@@ -2678,7 +2660,7 @@
           <a:p>
             <a:fld id="{386CE63F-9E7F-4C04-9D0D-FCA25A8E9E86}" type="datetime8">
               <a:rPr lang="en-US" smtClean="0"/>
-              <a:t>5/27/2019 10:24 AM</a:t>
+              <a:t>8/6/2019 10:28 AM</a:t>
             </a:fld>
             <a:endParaRPr lang="en-US" dirty="0"/>
           </a:p>
@@ -2849,7 +2831,7 @@
                 <a:ea typeface="+mn-ea"/>
                 <a:cs typeface="+mn-cs"/>
               </a:rPr>
-              <a:t>For the migration process itself, Azure Site Recovery supports a 'test failover'. This creates the Azure deployment in parallel with the existing deployment, allowing the migration process to be verified without risk of production impact. Likewise, database migration using DMS does not impact the existing production database.</a:t>
+              <a:t>For the migration process itself, Azure Migrate supports a 'test failover'. This creates the Azure deployment in parallel with the existing deployment, allowing the migration process to be verified without risk of production impact. Likewise, database migration using DMS does not impact the existing production database.</a:t>
             </a:r>
           </a:p>
           <a:p>
@@ -3162,7 +3144,7 @@
                 <a:ea typeface="+mn-ea"/>
                 <a:cs typeface="+mn-cs"/>
               </a:rPr>
-              <a:t> Using Azure Site Recovery, VMs can be grouped to reflect the application architecture. The dependency visualization feature of Azure Migrate helps identify and configure these groupings.</a:t>
+              <a:t> Using Azure Migrate, VMs can be grouped to reflect the application architecture. The dependency visualization feature of Azure Migrate helps identify and configure these groupings.</a:t>
             </a:r>
           </a:p>
           <a:p>
@@ -3384,7 +3366,7 @@
                 <a:ea typeface="+mn-ea"/>
                 <a:cs typeface="+mn-cs"/>
               </a:rPr>
-              <a:t>To ensure data consistency during migration, a short application downtime may be required. For application servers migrated using ASR, incremental replication keeps the duration of this downtime to a minimum, since the initial data transfer can happen while the application is on-line so only deltas need be synchronized during the migration window.</a:t>
+              <a:t>To ensure data consistency during migration, a short application downtime may be required. For application servers migrated using Azure Migrate, incremental replication keeps the duration of this downtime to a minimum, since the initial data transfer can happen while the application is on-line so only deltas need be synchronized during the migration window.</a:t>
             </a:r>
           </a:p>
           <a:p>
@@ -3935,7 +3917,7 @@
                   <a:prstClr val="black"/>
                 </a:solidFill>
               </a:rPr>
-              <a:t>5/27/2019 10:24 AM</a:t>
+              <a:t>8/6/2019 10:28 AM</a:t>
             </a:fld>
             <a:endParaRPr lang="en-US" dirty="0">
               <a:solidFill>
@@ -17202,7 +17184,7 @@
         </p:nvSpPr>
         <p:spPr bwMode="auto">
           <a:xfrm>
-            <a:off x="1740647" y="1943230"/>
+            <a:off x="2915397" y="1898780"/>
             <a:ext cx="1192284" cy="685894"/>
           </a:xfrm>
           <a:custGeom>
@@ -17633,8 +17615,8 @@
         </p:nvSpPr>
         <p:spPr bwMode="auto">
           <a:xfrm>
-            <a:off x="788751" y="3021032"/>
-            <a:ext cx="3096077" cy="689363"/>
+            <a:off x="1686873" y="3021032"/>
+            <a:ext cx="3760056" cy="689363"/>
           </a:xfrm>
           <a:prstGeom prst="rect">
             <a:avLst/>
@@ -17709,8 +17691,8 @@
         </p:nvSpPr>
         <p:spPr bwMode="auto">
           <a:xfrm>
-            <a:off x="788751" y="3941336"/>
-            <a:ext cx="3096077" cy="975520"/>
+            <a:off x="1686873" y="3941336"/>
+            <a:ext cx="3760056" cy="2288014"/>
           </a:xfrm>
           <a:prstGeom prst="rect">
             <a:avLst/>
@@ -17742,11 +17724,8 @@
                 <a:spcPct val="100000"/>
               </a:lnSpc>
               <a:spcBef>
-                <a:spcPts val="2000"/>
+                <a:spcPts val="600"/>
               </a:spcBef>
-              <a:spcAft>
-                <a:spcPts val="196"/>
-              </a:spcAft>
               <a:buClrTx/>
               <a:buSzTx/>
               <a:buFontTx/>
@@ -17755,57 +17734,73 @@
               <a:defRPr/>
             </a:pPr>
             <a:r>
-              <a:rPr kumimoji="0" lang="en-US" sz="1400" b="0" i="0" u="none" strike="noStrike" kern="0" cap="none" spc="0" normalizeH="0" baseline="0" noProof="0" dirty="0">
-                <a:ln>
-                  <a:noFill/>
-                </a:ln>
-                <a:solidFill>
-                  <a:schemeClr val="bg1"/>
-                </a:solidFill>
-                <a:effectLst/>
-                <a:uLnTx/>
-                <a:uFillTx/>
-                <a:latin typeface="Calibri"/>
-                <a:ea typeface="+mn-ea"/>
-                <a:cs typeface="+mn-cs"/>
-              </a:rPr>
-              <a:t>Azure Migrate can </a:t>
-            </a:r>
-            <a:r>
               <a:rPr lang="en-US" sz="1400" kern="0" dirty="0">
                 <a:solidFill>
                   <a:schemeClr val="bg1"/>
                 </a:solidFill>
                 <a:latin typeface="Calibri"/>
               </a:rPr>
-              <a:t>assess</a:t>
-            </a:r>
-            <a:r>
-              <a:rPr kumimoji="0" lang="en-US" sz="1400" b="0" i="0" u="none" strike="noStrike" kern="0" cap="none" spc="0" normalizeH="0" baseline="0" noProof="0" dirty="0">
-                <a:ln>
-                  <a:noFill/>
-                </a:ln>
+              <a:t>Azure Migrate can assess your VMware environment for Azure suitability, sizing recommendations and cost estimates.</a:t>
+            </a:r>
+          </a:p>
+          <a:p>
+            <a:pPr marL="0" marR="0" lvl="0" indent="0" defTabSz="896386" eaLnBrk="1" fontAlgn="auto" latinLnBrk="0" hangingPunct="1">
+              <a:lnSpc>
+                <a:spcPct val="100000"/>
+              </a:lnSpc>
+              <a:spcBef>
+                <a:spcPts val="600"/>
+              </a:spcBef>
+              <a:buClrTx/>
+              <a:buSzTx/>
+              <a:buFontTx/>
+              <a:buNone/>
+              <a:tabLst/>
+              <a:defRPr/>
+            </a:pPr>
+            <a:r>
+              <a:rPr lang="en-US" sz="1400" kern="0" dirty="0">
                 <a:solidFill>
                   <a:schemeClr val="bg1"/>
                 </a:solidFill>
-                <a:effectLst/>
-                <a:uLnTx/>
-                <a:uFillTx/>
                 <a:latin typeface="Calibri"/>
-                <a:ea typeface="+mn-ea"/>
-                <a:cs typeface="+mn-cs"/>
               </a:rPr>
-              <a:t> your VMware environment for Azure suitability, sizing recommendations and cost estimates.</a:t>
+              <a:t>Azure Migrate supports migration of VMware environments, using an agentless migration architecture.</a:t>
+            </a:r>
+          </a:p>
+          <a:p>
+            <a:pPr marL="0" marR="0" lvl="0" indent="0" defTabSz="896386" eaLnBrk="1" fontAlgn="auto" latinLnBrk="0" hangingPunct="1">
+              <a:lnSpc>
+                <a:spcPct val="100000"/>
+              </a:lnSpc>
+              <a:spcBef>
+                <a:spcPts val="600"/>
+              </a:spcBef>
+              <a:buClrTx/>
+              <a:buSzTx/>
+              <a:buFontTx/>
+              <a:buNone/>
+              <a:tabLst/>
+              <a:defRPr/>
+            </a:pPr>
+            <a:r>
+              <a:rPr lang="en-US" sz="1400" kern="0" dirty="0">
+                <a:solidFill>
+                  <a:schemeClr val="bg1"/>
+                </a:solidFill>
+                <a:latin typeface="Calibri"/>
+              </a:rPr>
+              <a:t>Physical server migration is also supported. Azure Migrate uses a migration engine based on Azure Site Recovery in this case.</a:t>
             </a:r>
           </a:p>
         </p:txBody>
       </p:sp>
       <p:pic>
         <p:nvPicPr>
-          <p:cNvPr id="3" name="Picture 2" descr="Azure Site Recovery Icon">
+          <p:cNvPr id="4" name="Picture 3" descr="Azure Database Migration Service Icon">
             <a:extLst>
               <a:ext uri="{FF2B5EF4-FFF2-40B4-BE49-F238E27FC236}">
-                <a16:creationId xmlns:a16="http://schemas.microsoft.com/office/drawing/2014/main" id="{D2C84F97-EC3D-4433-AA6D-6E50D54D66AE}"/>
+                <a16:creationId xmlns:a16="http://schemas.microsoft.com/office/drawing/2014/main" id="{B9B39E5A-1C11-43D8-9F87-B51F4C261125}"/>
               </a:ext>
             </a:extLst>
           </p:cNvPr>
@@ -17822,176 +17817,7 @@
         </p:blipFill>
         <p:spPr>
           <a:xfrm>
-            <a:off x="5238410" y="1288473"/>
-            <a:ext cx="1730761" cy="1599863"/>
-          </a:xfrm>
-          <a:prstGeom prst="rect">
-            <a:avLst/>
-          </a:prstGeom>
-        </p:spPr>
-      </p:pic>
-      <p:sp>
-        <p:nvSpPr>
-          <p:cNvPr id="114" name="Rectangle 113">
-            <a:extLst>
-              <a:ext uri="{FF2B5EF4-FFF2-40B4-BE49-F238E27FC236}">
-                <a16:creationId xmlns:a16="http://schemas.microsoft.com/office/drawing/2014/main" id="{B30574D1-FF21-4E16-A050-116BFB0D8B85}"/>
-              </a:ext>
-            </a:extLst>
-          </p:cNvPr>
-          <p:cNvSpPr/>
-          <p:nvPr/>
-        </p:nvSpPr>
-        <p:spPr bwMode="auto">
-          <a:xfrm>
-            <a:off x="4309902" y="3021032"/>
-            <a:ext cx="3096077" cy="689363"/>
-          </a:xfrm>
-          <a:prstGeom prst="rect">
-            <a:avLst/>
-          </a:prstGeom>
-          <a:solidFill>
-            <a:srgbClr val="FFFFFF"/>
-          </a:solidFill>
-          <a:ln w="25400" cap="flat" cmpd="sng" algn="ctr">
-            <a:noFill/>
-            <a:prstDash val="solid"/>
-            <a:headEnd type="none" w="med" len="med"/>
-            <a:tailEnd type="none" w="med" len="med"/>
-          </a:ln>
-          <a:effectLst/>
-        </p:spPr>
-        <p:txBody>
-          <a:bodyPr vert="horz" wrap="square" lIns="182854" tIns="91427" rIns="91427" bIns="91427" numCol="1" rtlCol="0" anchor="ctr" anchorCtr="0" compatLnSpc="1">
-            <a:prstTxWarp prst="textNoShape">
-              <a:avLst/>
-            </a:prstTxWarp>
-          </a:bodyPr>
-          <a:lstStyle/>
-          <a:p>
-            <a:pPr marL="0" marR="0" lvl="0" indent="0" algn="ctr" defTabSz="896386" eaLnBrk="1" fontAlgn="auto" latinLnBrk="0" hangingPunct="1">
-              <a:lnSpc>
-                <a:spcPct val="100000"/>
-              </a:lnSpc>
-              <a:spcBef>
-                <a:spcPts val="2000"/>
-              </a:spcBef>
-              <a:spcAft>
-                <a:spcPts val="0"/>
-              </a:spcAft>
-              <a:buClrTx/>
-              <a:buSzTx/>
-              <a:buFontTx/>
-              <a:buNone/>
-              <a:tabLst/>
-              <a:defRPr/>
-            </a:pPr>
-            <a:r>
-              <a:rPr kumimoji="0" lang="en-US" sz="2000" b="0" i="0" u="none" strike="noStrike" kern="0" cap="none" spc="0" normalizeH="0" baseline="0" noProof="0" dirty="0">
-                <a:ln>
-                  <a:noFill/>
-                </a:ln>
-                <a:solidFill>
-                  <a:srgbClr val="000000"/>
-                </a:solidFill>
-                <a:effectLst/>
-                <a:uLnTx/>
-                <a:uFillTx/>
-                <a:latin typeface="Calibri"/>
-                <a:ea typeface="+mn-ea"/>
-                <a:cs typeface="+mn-cs"/>
-              </a:rPr>
-              <a:t>Azure Site Recovery</a:t>
-            </a:r>
-          </a:p>
-        </p:txBody>
-      </p:sp>
-      <p:sp>
-        <p:nvSpPr>
-          <p:cNvPr id="115" name="Rectangle 114">
-            <a:extLst>
-              <a:ext uri="{FF2B5EF4-FFF2-40B4-BE49-F238E27FC236}">
-                <a16:creationId xmlns:a16="http://schemas.microsoft.com/office/drawing/2014/main" id="{3EDBA6EA-005B-4453-9C8F-333F84309D0D}"/>
-              </a:ext>
-            </a:extLst>
-          </p:cNvPr>
-          <p:cNvSpPr/>
-          <p:nvPr/>
-        </p:nvSpPr>
-        <p:spPr bwMode="auto">
-          <a:xfrm>
-            <a:off x="4309902" y="3941336"/>
-            <a:ext cx="3096077" cy="987462"/>
-          </a:xfrm>
-          <a:prstGeom prst="rect">
-            <a:avLst/>
-          </a:prstGeom>
-          <a:solidFill>
-            <a:srgbClr val="FFFFFF">
-              <a:lumMod val="95000"/>
-            </a:srgbClr>
-          </a:solidFill>
-          <a:ln w="25400" cap="flat" cmpd="sng" algn="ctr">
-            <a:noFill/>
-            <a:prstDash val="solid"/>
-            <a:headEnd type="none" w="med" len="med"/>
-            <a:tailEnd type="none" w="med" len="med"/>
-          </a:ln>
-          <a:effectLst/>
-        </p:spPr>
-        <p:txBody>
-          <a:bodyPr rot="0" spcFirstLastPara="0" vertOverflow="overflow" horzOverflow="overflow" vert="horz" wrap="square" lIns="108000" tIns="108000" rIns="108000" bIns="108000" numCol="1" spcCol="0" rtlCol="0" fromWordArt="0" anchor="t" anchorCtr="0" forceAA="0" compatLnSpc="1">
-            <a:prstTxWarp prst="textNoShape">
-              <a:avLst/>
-            </a:prstTxWarp>
-            <a:noAutofit/>
-          </a:bodyPr>
-          <a:lstStyle/>
-          <a:p>
-            <a:pPr lvl="0" defTabSz="896386">
-              <a:spcBef>
-                <a:spcPts val="2000"/>
-              </a:spcBef>
-              <a:spcAft>
-                <a:spcPts val="196"/>
-              </a:spcAft>
-              <a:defRPr/>
-            </a:pPr>
-            <a:r>
-              <a:rPr lang="en-US" sz="1400" kern="0" dirty="0">
-                <a:solidFill>
-                  <a:schemeClr val="bg1"/>
-                </a:solidFill>
-                <a:latin typeface="Calibri"/>
-              </a:rPr>
-              <a:t>Use Azure Site Recovery for disaster recovery or to migrate on-premises application to Azure.</a:t>
-            </a:r>
-          </a:p>
-        </p:txBody>
-      </p:sp>
-      <p:pic>
-        <p:nvPicPr>
-          <p:cNvPr id="4" name="Picture 3" descr="Azure Database Migration Service Icon">
-            <a:extLst>
-              <a:ext uri="{FF2B5EF4-FFF2-40B4-BE49-F238E27FC236}">
-                <a16:creationId xmlns:a16="http://schemas.microsoft.com/office/drawing/2014/main" id="{B9B39E5A-1C11-43D8-9F87-B51F4C261125}"/>
-              </a:ext>
-            </a:extLst>
-          </p:cNvPr>
-          <p:cNvPicPr>
-            <a:picLocks noChangeAspect="1"/>
-          </p:cNvPicPr>
-          <p:nvPr/>
-        </p:nvPicPr>
-        <p:blipFill>
-          <a:blip r:embed="rId4"/>
-          <a:stretch>
-            <a:fillRect/>
-          </a:stretch>
-        </p:blipFill>
-        <p:spPr>
-          <a:xfrm>
-            <a:off x="9107980" y="1545688"/>
+            <a:off x="7358019" y="1545688"/>
             <a:ext cx="1300032" cy="1158724"/>
           </a:xfrm>
           <a:prstGeom prst="rect">
@@ -18013,7 +17839,7 @@
         </p:nvSpPr>
         <p:spPr bwMode="auto">
           <a:xfrm>
-            <a:off x="7831053" y="3021032"/>
+            <a:off x="6081092" y="3021032"/>
             <a:ext cx="3760057" cy="689363"/>
           </a:xfrm>
           <a:prstGeom prst="rect">
@@ -18128,8 +17954,8 @@
         </p:nvSpPr>
         <p:spPr>
           <a:xfrm>
-            <a:off x="7831053" y="3941336"/>
-            <a:ext cx="3760057" cy="1819384"/>
+            <a:off x="6081092" y="3941336"/>
+            <a:ext cx="3760057" cy="2288014"/>
           </a:xfrm>
           <a:prstGeom prst="rect">
             <a:avLst/>
@@ -19887,7 +19713,7 @@
             <a:pPr lvl="1"/>
             <a:r>
               <a:rPr lang="en-US" dirty="0"/>
-              <a:t>Physical Servers: third-party tools</a:t>
+              <a:t>Physical Servers: Azure Migrate with third-party tools</a:t>
             </a:r>
           </a:p>
           <a:p>
@@ -19921,14 +19747,14 @@
             <a:pPr lvl="1"/>
             <a:r>
               <a:rPr lang="en-US" dirty="0"/>
-              <a:t>VMware: Azure Site Recovery (ASR)</a:t>
+              <a:t>VMware: Azure Migrate (agentless VMware migration)</a:t>
             </a:r>
           </a:p>
           <a:p>
             <a:pPr lvl="1"/>
             <a:r>
               <a:rPr lang="en-US" dirty="0"/>
-              <a:t>Physical Servers: ASR, port disks or third-party tools</a:t>
+              <a:t>Physical Servers: Azure Migrate, port disks or third-party tools</a:t>
             </a:r>
           </a:p>
           <a:p>
@@ -20053,7 +19879,7 @@
           <a:p>
             <a:r>
               <a:rPr lang="en-US" dirty="0"/>
-              <a:t>Preferred solution: Azure Migrate</a:t>
+              <a:t>Preferred assessment solution: Azure Migrate</a:t>
             </a:r>
           </a:p>
         </p:txBody>
@@ -20181,6 +20007,88 @@
       </p:grpSpPr>
       <p:sp>
         <p:nvSpPr>
+          <p:cNvPr id="7" name="Rectangle 6">
+            <a:extLst>
+              <a:ext uri="{FF2B5EF4-FFF2-40B4-BE49-F238E27FC236}">
+                <a16:creationId xmlns:a16="http://schemas.microsoft.com/office/drawing/2014/main" id="{DB6DAC27-8C8A-42FD-A742-7B499AD1DF88}"/>
+              </a:ext>
+            </a:extLst>
+          </p:cNvPr>
+          <p:cNvSpPr/>
+          <p:nvPr/>
+        </p:nvSpPr>
+        <p:spPr bwMode="auto">
+          <a:xfrm>
+            <a:off x="5435135" y="1581150"/>
+            <a:ext cx="6667965" cy="4127500"/>
+          </a:xfrm>
+          <a:prstGeom prst="rect">
+            <a:avLst/>
+          </a:prstGeom>
+          <a:solidFill>
+            <a:schemeClr val="tx1"/>
+          </a:solidFill>
+          <a:ln>
+            <a:noFill/>
+            <a:headEnd type="none" w="med" len="med"/>
+            <a:tailEnd type="none" w="med" len="med"/>
+          </a:ln>
+          <a:effectLst/>
+        </p:spPr>
+        <p:style>
+          <a:lnRef idx="1">
+            <a:schemeClr val="accent2"/>
+          </a:lnRef>
+          <a:fillRef idx="3">
+            <a:schemeClr val="accent2"/>
+          </a:fillRef>
+          <a:effectRef idx="2">
+            <a:schemeClr val="accent2"/>
+          </a:effectRef>
+          <a:fontRef idx="minor">
+            <a:schemeClr val="lt1"/>
+          </a:fontRef>
+        </p:style>
+        <p:txBody>
+          <a:bodyPr rot="0" spcFirstLastPara="0" vertOverflow="overflow" horzOverflow="overflow" vert="horz" wrap="square" lIns="182880" tIns="146304" rIns="182880" bIns="146304" numCol="1" spcCol="0" rtlCol="0" fromWordArt="0" anchor="t" anchorCtr="0" forceAA="0" compatLnSpc="1">
+            <a:prstTxWarp prst="textNoShape">
+              <a:avLst/>
+            </a:prstTxWarp>
+            <a:noAutofit/>
+          </a:bodyPr>
+          <a:lstStyle/>
+          <a:p>
+            <a:pPr algn="ctr" defTabSz="932472" fontAlgn="base">
+              <a:lnSpc>
+                <a:spcPct val="90000"/>
+              </a:lnSpc>
+              <a:spcBef>
+                <a:spcPct val="0"/>
+              </a:spcBef>
+              <a:spcAft>
+                <a:spcPct val="0"/>
+              </a:spcAft>
+            </a:pPr>
+            <a:endParaRPr lang="en-IE" sz="2400" dirty="0" err="1">
+              <a:gradFill>
+                <a:gsLst>
+                  <a:gs pos="0">
+                    <a:srgbClr val="FFFFFF"/>
+                  </a:gs>
+                  <a:gs pos="100000">
+                    <a:srgbClr val="FFFFFF"/>
+                  </a:gs>
+                </a:gsLst>
+                <a:lin ang="5400000" scaled="0"/>
+              </a:gradFill>
+              <a:ea typeface="Segoe UI" pitchFamily="34" charset="0"/>
+              <a:cs typeface="Segoe UI" pitchFamily="34" charset="0"/>
+            </a:endParaRPr>
+          </a:p>
+        </p:txBody>
+      </p:sp>
+      <p:sp>
+        <p:nvSpPr>
           <p:cNvPr id="2" name="Title 1"/>
           <p:cNvSpPr>
             <a:spLocks noGrp="1"/>
@@ -20196,7 +20104,7 @@
           <a:p>
             <a:r>
               <a:rPr lang="en-US" dirty="0"/>
-              <a:t>Preferred solution: Azure Site Recovery</a:t>
+              <a:t>Preferred migration solution: Azure Migrate</a:t>
             </a:r>
           </a:p>
         </p:txBody>
@@ -20220,7 +20128,7 @@
         <p:spPr>
           <a:xfrm>
             <a:off x="269240" y="1189177"/>
-            <a:ext cx="11387264" cy="1987467"/>
+            <a:ext cx="5064760" cy="5678478"/>
           </a:xfrm>
         </p:spPr>
         <p:txBody>
@@ -20229,65 +20137,31 @@
           <a:p>
             <a:r>
               <a:rPr lang="en-IE" sz="3200" dirty="0"/>
-              <a:t>Migration and Disaster Recovery</a:t>
-            </a:r>
-          </a:p>
-          <a:p>
-            <a:r>
+              <a:t>Agentless or agent-based</a:t>
+            </a:r>
+            <a:br>
               <a:rPr lang="en-IE" sz="3200" dirty="0"/>
-              <a:t>All workloads	</a:t>
+            </a:br>
+            <a:r>
+              <a:rPr lang="en-IE" sz="3200" dirty="0"/>
+              <a:t>VMware migration options</a:t>
+            </a:r>
+          </a:p>
+          <a:p>
+            <a:r>
+              <a:rPr lang="en-IE" sz="3200" dirty="0"/>
+              <a:t>Physical and Hyper-V support</a:t>
             </a:r>
           </a:p>
           <a:p>
             <a:pPr lvl="1"/>
             <a:r>
               <a:rPr lang="en-IE" sz="1632" dirty="0"/>
-              <a:t>Physical, Hyper-V, VMware, Windows, Linux, …</a:t>
-            </a:r>
-          </a:p>
-          <a:p>
-            <a:endParaRPr lang="en-IE" sz="3200" dirty="0"/>
-          </a:p>
-        </p:txBody>
-      </p:sp>
-      <p:sp>
-        <p:nvSpPr>
-          <p:cNvPr id="5" name="Rectangle 4">
-            <a:extLst>
-              <a:ext uri="{FF2B5EF4-FFF2-40B4-BE49-F238E27FC236}">
-                <a16:creationId xmlns:a16="http://schemas.microsoft.com/office/drawing/2014/main" id="{C59D0E14-C6F9-4B45-B4C4-6F39AE4998B2}"/>
-              </a:ext>
-            </a:extLst>
-          </p:cNvPr>
-          <p:cNvSpPr/>
-          <p:nvPr/>
-        </p:nvSpPr>
-        <p:spPr>
-          <a:xfrm>
-            <a:off x="6701367" y="1239391"/>
-            <a:ext cx="6096000" cy="1077218"/>
-          </a:xfrm>
-          <a:prstGeom prst="rect">
-            <a:avLst/>
-          </a:prstGeom>
-        </p:spPr>
-        <p:txBody>
-          <a:bodyPr>
-            <a:spAutoFit/>
-          </a:bodyPr>
-          <a:lstStyle/>
-          <a:p>
-            <a:pPr marL="336145" lvl="0" indent="-336145" defTabSz="914367">
-              <a:lnSpc>
-                <a:spcPct val="90000"/>
-              </a:lnSpc>
-              <a:spcBef>
-                <a:spcPct val="20000"/>
-              </a:spcBef>
-              <a:buSzPct val="90000"/>
-              <a:buFont typeface="Arial" pitchFamily="34" charset="0"/>
-              <a:buChar char="•"/>
-            </a:pPr>
+              <a:t>Using Azure Site Recovery migration engine</a:t>
+            </a:r>
+          </a:p>
+          <a:p>
+            <a:pPr lvl="0"/>
             <a:r>
               <a:rPr lang="en-IE" sz="3200" dirty="0">
                 <a:gradFill>
@@ -20301,23 +20175,12 @@
                   </a:gsLst>
                   <a:lin ang="5400000" scaled="0"/>
                 </a:gradFill>
-                <a:latin typeface="Segoe UI Light"/>
               </a:rPr>
-              <a:t>Incremental data transfer</a:t>
-            </a:r>
-          </a:p>
-          <a:p>
-            <a:pPr marL="336145" lvl="0" indent="-336145" defTabSz="914367">
-              <a:lnSpc>
-                <a:spcPct val="90000"/>
-              </a:lnSpc>
-              <a:spcBef>
-                <a:spcPct val="20000"/>
-              </a:spcBef>
-              <a:buSzPct val="90000"/>
-              <a:buFont typeface="Arial" pitchFamily="34" charset="0"/>
-              <a:buChar char="•"/>
-            </a:pPr>
+              <a:t>Integrated with Migration Assessment</a:t>
+            </a:r>
+          </a:p>
+          <a:p>
+            <a:pPr lvl="0"/>
             <a:r>
               <a:rPr lang="en-IE" sz="3200" dirty="0">
                 <a:gradFill>
@@ -20331,19 +20194,51 @@
                   </a:gsLst>
                   <a:lin ang="5400000" scaled="0"/>
                 </a:gradFill>
-                <a:latin typeface="Segoe UI Light"/>
+              </a:rPr>
+              <a:t>Incremental data transfer</a:t>
+            </a:r>
+          </a:p>
+          <a:p>
+            <a:pPr lvl="0"/>
+            <a:r>
+              <a:rPr lang="en-IE" sz="3200" dirty="0">
+                <a:gradFill>
+                  <a:gsLst>
+                    <a:gs pos="1250">
+                      <a:srgbClr val="FFFFFF"/>
+                    </a:gs>
+                    <a:gs pos="100000">
+                      <a:srgbClr val="FFFFFF"/>
+                    </a:gs>
+                  </a:gsLst>
+                  <a:lin ang="5400000" scaled="0"/>
+                </a:gradFill>
               </a:rPr>
               <a:t>Test failover</a:t>
             </a:r>
           </a:p>
+          <a:p>
+            <a:pPr lvl="1"/>
+            <a:endParaRPr lang="en-IE" sz="1632" dirty="0"/>
+          </a:p>
+          <a:p>
+            <a:pPr lvl="1"/>
+            <a:r>
+              <a:rPr lang="en-IE" sz="100" dirty="0"/>
+              <a:t>Us</a:t>
+            </a:r>
+          </a:p>
+          <a:p>
+            <a:endParaRPr lang="en-IE" sz="3200" dirty="0"/>
+          </a:p>
         </p:txBody>
       </p:sp>
       <p:pic>
         <p:nvPicPr>
-          <p:cNvPr id="3" name="Picture 2" descr="Diagram of Azure Site Recovery architecture. On the left, VMs in VMware are shown with the mobility service installed, sending data to the Config Server and Process Server. These in turn send data to the Azure Site Recovery service, on the right.">
+          <p:cNvPr id="6" name="Picture 5" descr="Diagram showing the Azure Migrate architecture and process. Process steps are:&#10;1) Download and configure appliance&#10;2) Start discovery&#10;3) Create assessment&#10;4) Start replication">
             <a:extLst>
               <a:ext uri="{FF2B5EF4-FFF2-40B4-BE49-F238E27FC236}">
-                <a16:creationId xmlns:a16="http://schemas.microsoft.com/office/drawing/2014/main" id="{63C7F7BC-D313-4657-868B-1F62B1AB2637}"/>
+                <a16:creationId xmlns:a16="http://schemas.microsoft.com/office/drawing/2014/main" id="{824A3DE5-53B1-43AE-B374-1C0FA147BF93}"/>
               </a:ext>
             </a:extLst>
           </p:cNvPr>
@@ -20353,15 +20248,21 @@
           <p:nvPr/>
         </p:nvPicPr>
         <p:blipFill>
-          <a:blip r:embed="rId3"/>
+          <a:blip r:embed="rId3">
+            <a:extLst>
+              <a:ext uri="{28A0092B-C50C-407E-A947-70E740481C1C}">
+                <a14:useLocalDpi xmlns:a14="http://schemas.microsoft.com/office/drawing/2010/main" val="0"/>
+              </a:ext>
+            </a:extLst>
+          </a:blip>
           <a:stretch>
             <a:fillRect/>
           </a:stretch>
         </p:blipFill>
         <p:spPr>
           <a:xfrm>
-            <a:off x="1191067" y="2696374"/>
-            <a:ext cx="9809866" cy="3872115"/>
+            <a:off x="5644685" y="1755872"/>
+            <a:ext cx="6217359" cy="3651881"/>
           </a:xfrm>
           <a:prstGeom prst="rect">
             <a:avLst/>
@@ -20513,7 +20414,7 @@
               <a:rPr lang="en-US" sz="2800" dirty="0">
                 <a:latin typeface="+mj-lt"/>
               </a:rPr>
-              <a:t>At the end of this workshop, you will be better able to design and implement the discovery and assessment of environments to evaluate their readiness for migrating to Azure using services including Azure Migrate, Azure Database Migration Service, and Azure Site Recovery.</a:t>
+              <a:t>At the end of this workshop, you will be better able to design and implement the discovery and assessment of environments to evaluate their readiness for migrating to Azure using services including Azure Migrate and Azure Database Migration Service.</a:t>
             </a:r>
             <a:endParaRPr lang="en-US" dirty="0"/>
           </a:p>
@@ -20576,7 +20477,7 @@
         <p:spPr>
           <a:xfrm>
             <a:off x="269239" y="1189177"/>
-            <a:ext cx="11653523" cy="4358116"/>
+            <a:ext cx="11653523" cy="4456605"/>
           </a:xfrm>
         </p:spPr>
         <p:txBody>
@@ -20585,7 +20486,13 @@
           <a:p>
             <a:r>
               <a:rPr lang="en-IE" sz="3200" dirty="0"/>
-              <a:t>Uses Database Migration Assistant (DMA) for SQL assessment and schema migration</a:t>
+              <a:t>Use Database Migration Assistant (DMA) for SQL assessment</a:t>
+            </a:r>
+          </a:p>
+          <a:p>
+            <a:r>
+              <a:rPr lang="en-IE" sz="3200" dirty="0"/>
+              <a:t>Use DMS for schema migration and data migration</a:t>
             </a:r>
           </a:p>
           <a:p>
@@ -20726,7 +20633,7 @@
           <a:p>
             <a:r>
               <a:rPr lang="en-IE" sz="4400" dirty="0"/>
-              <a:t>Solution Details: Azure Migrate Readiness Report</a:t>
+              <a:t>Solution Details: Readiness Report</a:t>
             </a:r>
           </a:p>
         </p:txBody>
@@ -20861,7 +20768,7 @@
           <a:p>
             <a:r>
               <a:rPr lang="en-IE" dirty="0"/>
-              <a:t>Solution Details: Azure Migrate Cost Estimate</a:t>
+              <a:t>Solution Details: Cost Estimate</a:t>
             </a:r>
           </a:p>
         </p:txBody>
@@ -21029,6 +20936,45 @@
       </p:grpSpPr>
       <p:sp>
         <p:nvSpPr>
+          <p:cNvPr id="3" name="Text Placeholder 2">
+            <a:extLst>
+              <a:ext uri="{FF2B5EF4-FFF2-40B4-BE49-F238E27FC236}">
+                <a16:creationId xmlns:a16="http://schemas.microsoft.com/office/drawing/2014/main" id="{E62D2B87-13E1-4D84-A606-CB293B6C82B6}"/>
+              </a:ext>
+            </a:extLst>
+          </p:cNvPr>
+          <p:cNvSpPr>
+            <a:spLocks noGrp="1"/>
+          </p:cNvSpPr>
+          <p:nvPr>
+            <p:ph type="body" sz="quarter" idx="10"/>
+          </p:nvPr>
+        </p:nvSpPr>
+        <p:spPr>
+          <a:xfrm>
+            <a:off x="269239" y="1189177"/>
+            <a:ext cx="11653523" cy="1612749"/>
+          </a:xfrm>
+        </p:spPr>
+        <p:txBody>
+          <a:bodyPr/>
+          <a:lstStyle/>
+          <a:p>
+            <a:r>
+              <a:rPr lang="en-IE" sz="3200" dirty="0"/>
+              <a:t>Creates map of VM network dependencies</a:t>
+            </a:r>
+          </a:p>
+          <a:p>
+            <a:r>
+              <a:rPr lang="en-IE" sz="3200" dirty="0"/>
+              <a:t>Identify related machines to plan migration groups and dependencies</a:t>
+            </a:r>
+          </a:p>
+        </p:txBody>
+      </p:sp>
+      <p:sp>
+        <p:nvSpPr>
           <p:cNvPr id="2" name="Title 1">
             <a:extLst>
               <a:ext uri="{FF2B5EF4-FFF2-40B4-BE49-F238E27FC236}">
@@ -21049,47 +20995,8 @@
           <a:lstStyle/>
           <a:p>
             <a:r>
-              <a:rPr lang="en-IE" sz="3600" dirty="0"/>
-              <a:t>Solution Details: Azure Migrate Dependency Visualization</a:t>
-            </a:r>
-          </a:p>
-        </p:txBody>
-      </p:sp>
-      <p:sp>
-        <p:nvSpPr>
-          <p:cNvPr id="3" name="Text Placeholder 2">
-            <a:extLst>
-              <a:ext uri="{FF2B5EF4-FFF2-40B4-BE49-F238E27FC236}">
-                <a16:creationId xmlns:a16="http://schemas.microsoft.com/office/drawing/2014/main" id="{E62D2B87-13E1-4D84-A606-CB293B6C82B6}"/>
-              </a:ext>
-            </a:extLst>
-          </p:cNvPr>
-          <p:cNvSpPr>
-            <a:spLocks noGrp="1"/>
-          </p:cNvSpPr>
-          <p:nvPr>
-            <p:ph type="body" sz="quarter" idx="10"/>
-          </p:nvPr>
-        </p:nvSpPr>
-        <p:spPr>
-          <a:xfrm>
-            <a:off x="269239" y="1189177"/>
-            <a:ext cx="11653523" cy="1612749"/>
-          </a:xfrm>
-        </p:spPr>
-        <p:txBody>
-          <a:bodyPr/>
-          <a:lstStyle/>
-          <a:p>
-            <a:r>
-              <a:rPr lang="en-IE" sz="3200" dirty="0"/>
-              <a:t>Creates map of VM network dependencies</a:t>
-            </a:r>
-          </a:p>
-          <a:p>
-            <a:r>
-              <a:rPr lang="en-IE" sz="3200" dirty="0"/>
-              <a:t>Identify related machines to plan migration groups and dependencies</a:t>
+              <a:rPr lang="en-IE" dirty="0"/>
+              <a:t>Solution Details: Dependency Visualization</a:t>
             </a:r>
           </a:p>
         </p:txBody>
@@ -21172,7 +21079,12 @@
             <p:ph type="body" sz="quarter" idx="10"/>
           </p:nvPr>
         </p:nvSpPr>
-        <p:spPr/>
+        <p:spPr>
+          <a:xfrm>
+            <a:off x="269239" y="1189177"/>
+            <a:ext cx="11653523" cy="4903137"/>
+          </a:xfrm>
+        </p:spPr>
         <p:txBody>
           <a:bodyPr/>
           <a:lstStyle/>
@@ -21186,7 +21098,7 @@
             <a:pPr lvl="1"/>
             <a:r>
               <a:rPr lang="en-IE" dirty="0"/>
-              <a:t>Accounts, permissions, recovery services vault, storage, network…everything except the VMs and their disks</a:t>
+              <a:t>Accounts, permissions, storage, network…everything except the VMs and their disks</a:t>
             </a:r>
           </a:p>
           <a:p>
@@ -21198,8 +21110,19 @@
           <a:p>
             <a:pPr lvl="1"/>
             <a:r>
+              <a:rPr lang="en-IE" dirty="0" err="1"/>
+              <a:t>VWware</a:t>
+            </a:r>
+            <a:r>
               <a:rPr lang="en-IE" dirty="0"/>
-              <a:t>VMware or Physical: Configuration server, process server, mobility agent</a:t>
+              <a:t> (agent-less): Azure migrate appliance VM; nothing to install on each VM</a:t>
+            </a:r>
+          </a:p>
+          <a:p>
+            <a:pPr lvl="1"/>
+            <a:r>
+              <a:rPr lang="en-IE" dirty="0"/>
+              <a:t>VMware (agent-based) or physical servers: Replication appliance VM or server; plus Mobility Service agent on each VM or machine to be migrated</a:t>
             </a:r>
           </a:p>
           <a:p>
@@ -21242,7 +21165,7 @@
           <a:p>
             <a:r>
               <a:rPr lang="en-IE" dirty="0"/>
-              <a:t>Solution Details: Azure Site Recovery</a:t>
+              <a:t>Solution Details: Migration</a:t>
             </a:r>
           </a:p>
         </p:txBody>
@@ -21299,7 +21222,7 @@
         <p:spPr>
           <a:xfrm>
             <a:off x="269239" y="1189177"/>
-            <a:ext cx="11653523" cy="5703484"/>
+            <a:ext cx="11653523" cy="5305235"/>
           </a:xfrm>
         </p:spPr>
         <p:txBody>
@@ -21315,13 +21238,6 @@
             <a:pPr lvl="1"/>
             <a:r>
               <a:rPr lang="en-IE" sz="2400" dirty="0"/>
-              <a:t>ASR failover</a:t>
-            </a:r>
-          </a:p>
-          <a:p>
-            <a:pPr lvl="1"/>
-            <a:r>
-              <a:rPr lang="en-IE" sz="2400" dirty="0"/>
               <a:t>Update application settings (connection strings, configurations, etc)</a:t>
             </a:r>
           </a:p>
@@ -21349,7 +21265,7 @@
             <a:pPr lvl="1"/>
             <a:r>
               <a:rPr lang="en-IE" sz="2400" dirty="0"/>
-              <a:t>Install VM agent / uninstall mobility agent</a:t>
+              <a:t>Install VM agent / uninstall Mobility Service agent</a:t>
             </a:r>
           </a:p>
           <a:p>
@@ -21408,7 +21324,7 @@
           <a:p>
             <a:r>
               <a:rPr lang="en-IE" dirty="0"/>
-              <a:t>Solution Details: Azure Site Recovery</a:t>
+              <a:t>Solution Details: Migration</a:t>
             </a:r>
           </a:p>
         </p:txBody>
@@ -21465,7 +21381,7 @@
         <p:spPr>
           <a:xfrm>
             <a:off x="269239" y="1189177"/>
-            <a:ext cx="11653523" cy="5639236"/>
+            <a:ext cx="11653523" cy="5273175"/>
           </a:xfrm>
         </p:spPr>
         <p:txBody>
@@ -21474,53 +21390,62 @@
           <a:p>
             <a:r>
               <a:rPr lang="en-IE" dirty="0"/>
+              <a:t>Use DMA for assessment</a:t>
+            </a:r>
+          </a:p>
+          <a:p>
+            <a:pPr lvl="1"/>
+            <a:r>
+              <a:rPr lang="en-IE" dirty="0"/>
+              <a:t>Install on any machine with database access</a:t>
+            </a:r>
+          </a:p>
+          <a:p>
+            <a:r>
+              <a:rPr lang="en-IE" dirty="0"/>
+              <a:t>Use DMS for schema and data migration</a:t>
+            </a:r>
+          </a:p>
+          <a:p>
+            <a:pPr lvl="1"/>
+            <a:r>
+              <a:rPr lang="en-IE" dirty="0"/>
               <a:t>Create target DB in Azure</a:t>
             </a:r>
           </a:p>
           <a:p>
+            <a:pPr lvl="1"/>
             <a:r>
               <a:rPr lang="en-IE" dirty="0"/>
-              <a:t>Create VNet with access to source and target</a:t>
-            </a:r>
-          </a:p>
-          <a:p>
-            <a:pPr lvl="1"/>
-            <a:r>
-              <a:rPr lang="en-IE" sz="2400" dirty="0"/>
+              <a:t>Create VNet with access to source and target DBs</a:t>
+            </a:r>
+          </a:p>
+          <a:p>
+            <a:pPr lvl="2"/>
+            <a:r>
+              <a:rPr lang="en-IE" sz="2008" dirty="0"/>
               <a:t>DMS deploys into this VNet for connectivity</a:t>
             </a:r>
           </a:p>
           <a:p>
-            <a:pPr lvl="1"/>
-            <a:r>
-              <a:rPr lang="en-IE" sz="2400" dirty="0"/>
+            <a:pPr lvl="2"/>
+            <a:r>
+              <a:rPr lang="en-IE" sz="2008" dirty="0"/>
               <a:t>Use S2S VPN or ExpressRoute for on-premises access</a:t>
             </a:r>
           </a:p>
           <a:p>
-            <a:pPr lvl="1"/>
-            <a:r>
-              <a:rPr lang="en-IE" sz="2400" dirty="0"/>
+            <a:pPr lvl="2"/>
+            <a:r>
+              <a:rPr lang="en-IE" sz="2008" dirty="0"/>
               <a:t>Requires Internet access on TCP ports 443, 53, 9354, 445, 12000</a:t>
             </a:r>
           </a:p>
           <a:p>
-            <a:pPr lvl="1"/>
-            <a:r>
-              <a:rPr lang="en-IE" sz="2400" dirty="0"/>
+            <a:pPr lvl="2"/>
+            <a:r>
+              <a:rPr lang="en-IE" sz="2008" dirty="0"/>
               <a:t>Database access on port 1433 (NSGs, firewalls)</a:t>
-            </a:r>
-          </a:p>
-          <a:p>
-            <a:r>
-              <a:rPr lang="en-IE" dirty="0"/>
-              <a:t>Use DMA for assessment and schema migration</a:t>
-            </a:r>
-          </a:p>
-          <a:p>
-            <a:r>
-              <a:rPr lang="en-IE" dirty="0"/>
-              <a:t>Use DMS for data migration</a:t>
             </a:r>
           </a:p>
           <a:p>
@@ -21879,7 +21804,7 @@
                   <a:schemeClr val="tx1"/>
                 </a:solidFill>
               </a:rPr>
-              <a:t>For the migration process itself, Azure Site Recovery supports a 'test failover'. This creates the Azure deployment in parallel with the existing deployment, allowing the migration process to be verified without risk of production impact. Likewise, database migration using DMS does not impact the existing production database.</a:t>
+              <a:t>For the migration process itself, Azure Migrate supports a 'test failover'. This creates the Azure deployment in parallel with the existing deployment, allowing the migration process to be verified without risk of production impact. Likewise, database migration using DMS does not impact the existing production database.</a:t>
             </a:r>
           </a:p>
           <a:p>
@@ -22318,7 +22243,7 @@
             </a:r>
             <a:r>
               <a:rPr lang="en-US" sz="2400" dirty="0"/>
-              <a:t>Using Azure Site Recovery, VMs can be grouped to reflect the application architecture. The dependency visualization feature of Azure Migrate helps identify and configure these groupings.</a:t>
+              <a:t>Using Azure Migrate, VMs can be grouped to reflect the application architecture. The dependency visualization feature of Azure Migrate helps identify and configure these groupings.</a:t>
             </a:r>
           </a:p>
           <a:p>
@@ -22327,13 +22252,7 @@
           <a:p>
             <a:r>
               <a:rPr lang="en-US" sz="2400" dirty="0"/>
-              <a:t>The migration process can then be staged to migrate different groups of VMs separately. Custom scripts can be used to perform custom pre- and post-migration operations.</a:t>
-            </a:r>
-          </a:p>
-          <a:p>
-            <a:r>
-              <a:rPr lang="en-US" sz="2400" dirty="0"/>
-              <a:t>Similar orchestration is also supported by third-party migration tools, used for physical servers.</a:t>
+              <a:t>The migration process can then be staged to migrate different groups of VMs separately. Custom scripts can be used to perform custom pre- and post-migration operations. Similar orchestration is also supported by third-party migration tools, used for physical servers.</a:t>
             </a:r>
           </a:p>
         </p:txBody>
@@ -22447,7 +22366,7 @@
             </a:r>
             <a:r>
               <a:rPr lang="en-US" sz="2400" dirty="0"/>
-              <a:t>To ensure data consistency during migration, a short application downtime may be required. With ASR, incremental replication keeps the duration of this downtime to a minimum.</a:t>
+              <a:t>To ensure data consistency during migration, a short application downtime may be required. With Azure Migrate, incremental replication keeps the duration of this downtime to a minimum.</a:t>
             </a:r>
           </a:p>
           <a:p>
@@ -22588,7 +22507,15 @@
           <a:p>
             <a:r>
               <a:rPr lang="en-US" sz="2400" dirty="0"/>
-              <a:t>The Build a business justification for cloud migration guide is a useful resource for dispelling cloud adoption myths and building a realistic business case.</a:t>
+              <a:t>The </a:t>
+            </a:r>
+            <a:r>
+              <a:rPr lang="en-US" sz="2400" i="1" dirty="0"/>
+              <a:t>Build a business justification for cloud migration</a:t>
+            </a:r>
+            <a:r>
+              <a:rPr lang="en-US" sz="2400" dirty="0"/>
+              <a:t> guide is a useful resource for dispelling cloud adoption myths and building a realistic business case.</a:t>
             </a:r>
           </a:p>
           <a:p>
@@ -24458,15 +24385,6 @@
 </file>
 
 <file path=customXml/item1.xml><?xml version="1.0" encoding="utf-8"?>
-<p:properties xmlns:p="http://schemas.microsoft.com/office/2006/metadata/properties" xmlns:xsi="http://www.w3.org/2001/XMLSchema-instance" xmlns:pc="http://schemas.microsoft.com/office/infopath/2007/PartnerControls">
-  <documentManagement>
-    <_ip_UnifiedCompliancePolicyUIAction xmlns="http://schemas.microsoft.com/sharepoint/v3" xsi:nil="true"/>
-    <_ip_UnifiedCompliancePolicyProperties xmlns="http://schemas.microsoft.com/sharepoint/v3" xsi:nil="true"/>
-  </documentManagement>
-</p:properties>
-</file>
-
-<file path=customXml/item2.xml><?xml version="1.0" encoding="utf-8"?>
 <ct:contentTypeSchema xmlns:ct="http://schemas.microsoft.com/office/2006/metadata/contentType" xmlns:ma="http://schemas.microsoft.com/office/2006/metadata/properties/metaAttributes" ct:_="" ma:_="" ma:contentTypeName="Document" ma:contentTypeID="0x010100D15DFA3690A15B4081582BBCC6BEAC3E" ma:contentTypeVersion="9" ma:contentTypeDescription="Create a new document." ma:contentTypeScope="" ma:versionID="642da1784587cbe85a7fdbbe4dc36103">
   <xsd:schema xmlns:xsd="http://www.w3.org/2001/XMLSchema" xmlns:xs="http://www.w3.org/2001/XMLSchema" xmlns:p="http://schemas.microsoft.com/office/2006/metadata/properties" xmlns:ns1="http://schemas.microsoft.com/sharepoint/v3" xmlns:ns2="2023ac63-7b75-4916-a9ee-591457758eee" xmlns:ns3="d9c797ad-d7c3-4982-82b7-81352a75e4a5" targetNamespace="http://schemas.microsoft.com/office/2006/metadata/properties" ma:root="true" ma:fieldsID="91198b0246576053cc55dd2c67035a89" ns1:_="" ns2:_="" ns3:_="">
     <xsd:import namespace="http://schemas.microsoft.com/sharepoint/v3"/>
@@ -24668,6 +24586,15 @@
 </ct:contentTypeSchema>
 </file>
 
+<file path=customXml/item2.xml><?xml version="1.0" encoding="utf-8"?>
+<p:properties xmlns:p="http://schemas.microsoft.com/office/2006/metadata/properties" xmlns:xsi="http://www.w3.org/2001/XMLSchema-instance" xmlns:pc="http://schemas.microsoft.com/office/infopath/2007/PartnerControls">
+  <documentManagement>
+    <_ip_UnifiedCompliancePolicyUIAction xmlns="http://schemas.microsoft.com/sharepoint/v3" xsi:nil="true"/>
+    <_ip_UnifiedCompliancePolicyProperties xmlns="http://schemas.microsoft.com/sharepoint/v3" xsi:nil="true"/>
+  </documentManagement>
+</p:properties>
+</file>
+
 <file path=customXml/item3.xml><?xml version="1.0" encoding="utf-8"?>
 <?mso-contentType ?>
 <FormTemplates xmlns="http://schemas.microsoft.com/sharepoint/v3/contenttype/forms">
@@ -24678,24 +24605,6 @@
 </file>
 
 <file path=customXml/itemProps1.xml><?xml version="1.0" encoding="utf-8"?>
-<ds:datastoreItem xmlns:ds="http://schemas.openxmlformats.org/officeDocument/2006/customXml" ds:itemID="{BAF7D529-36AB-45DA-B239-2F912F2D1610}">
-  <ds:schemaRefs>
-    <ds:schemaRef ds:uri="http://purl.org/dc/elements/1.1/"/>
-    <ds:schemaRef ds:uri="http://schemas.microsoft.com/office/2006/metadata/properties"/>
-    <ds:schemaRef ds:uri="http://purl.org/dc/dcmitype/"/>
-    <ds:schemaRef ds:uri="http://schemas.microsoft.com/sharepoint/v3"/>
-    <ds:schemaRef ds:uri="http://purl.org/dc/terms/"/>
-    <ds:schemaRef ds:uri="2023ac63-7b75-4916-a9ee-591457758eee"/>
-    <ds:schemaRef ds:uri="http://schemas.microsoft.com/office/2006/documentManagement/types"/>
-    <ds:schemaRef ds:uri="http://schemas.microsoft.com/office/infopath/2007/PartnerControls"/>
-    <ds:schemaRef ds:uri="http://schemas.openxmlformats.org/package/2006/metadata/core-properties"/>
-    <ds:schemaRef ds:uri="d9c797ad-d7c3-4982-82b7-81352a75e4a5"/>
-    <ds:schemaRef ds:uri="http://www.w3.org/XML/1998/namespace"/>
-  </ds:schemaRefs>
-</ds:datastoreItem>
-</file>
-
-<file path=customXml/itemProps2.xml><?xml version="1.0" encoding="utf-8"?>
 <ds:datastoreItem xmlns:ds="http://schemas.openxmlformats.org/officeDocument/2006/customXml" ds:itemID="{255F5BEB-6AD6-480A-8556-C80C5EBC10F2}">
   <ds:schemaRefs>
     <ds:schemaRef ds:uri="http://schemas.microsoft.com/office/2006/metadata/contentType"/>
@@ -24715,6 +24624,24 @@
 </ds:datastoreItem>
 </file>
 
+<file path=customXml/itemProps2.xml><?xml version="1.0" encoding="utf-8"?>
+<ds:datastoreItem xmlns:ds="http://schemas.openxmlformats.org/officeDocument/2006/customXml" ds:itemID="{BAF7D529-36AB-45DA-B239-2F912F2D1610}">
+  <ds:schemaRefs>
+    <ds:schemaRef ds:uri="http://purl.org/dc/elements/1.1/"/>
+    <ds:schemaRef ds:uri="http://schemas.microsoft.com/office/2006/metadata/properties"/>
+    <ds:schemaRef ds:uri="http://purl.org/dc/dcmitype/"/>
+    <ds:schemaRef ds:uri="http://schemas.microsoft.com/sharepoint/v3"/>
+    <ds:schemaRef ds:uri="http://purl.org/dc/terms/"/>
+    <ds:schemaRef ds:uri="2023ac63-7b75-4916-a9ee-591457758eee"/>
+    <ds:schemaRef ds:uri="http://schemas.microsoft.com/office/2006/documentManagement/types"/>
+    <ds:schemaRef ds:uri="http://schemas.microsoft.com/office/infopath/2007/PartnerControls"/>
+    <ds:schemaRef ds:uri="http://schemas.openxmlformats.org/package/2006/metadata/core-properties"/>
+    <ds:schemaRef ds:uri="d9c797ad-d7c3-4982-82b7-81352a75e4a5"/>
+    <ds:schemaRef ds:uri="http://www.w3.org/XML/1998/namespace"/>
+  </ds:schemaRefs>
+</ds:datastoreItem>
+</file>
+
 <file path=customXml/itemProps3.xml><?xml version="1.0" encoding="utf-8"?>
 <ds:datastoreItem xmlns:ds="http://schemas.openxmlformats.org/officeDocument/2006/customXml" ds:itemID="{F18501AF-04CF-4482-BAE1-607B49DDC378}">
   <ds:schemaRefs>

</xml_diff>